<commit_message>
Update powerpoint and finish building initial parameters, compile df of var_cost
</commit_message>
<xml_diff>
--- a/presentations/Update_2019-07-2.pptx
+++ b/presentations/Update_2019-07-2.pptx
@@ -12,10 +12,11 @@
     <p:sldId id="261" r:id="rId6"/>
     <p:sldId id="262" r:id="rId7"/>
     <p:sldId id="267" r:id="rId8"/>
-    <p:sldId id="268" r:id="rId9"/>
-    <p:sldId id="264" r:id="rId10"/>
-    <p:sldId id="265" r:id="rId11"/>
-    <p:sldId id="266" r:id="rId12"/>
+    <p:sldId id="269" r:id="rId9"/>
+    <p:sldId id="265" r:id="rId10"/>
+    <p:sldId id="266" r:id="rId11"/>
+    <p:sldId id="270" r:id="rId12"/>
+    <p:sldId id="271" r:id="rId13"/>
   </p:sldIdLst>
   <p:sldSz cx="12192000" cy="6858000"/>
   <p:notesSz cx="6858000" cy="9144000"/>
@@ -271,7 +272,7 @@
           <a:p>
             <a:fld id="{E7645487-47E7-426D-ABE3-F7B06940B163}" type="datetimeFigureOut">
               <a:rPr lang="en-AT" smtClean="0"/>
-              <a:t>28/06/2019</a:t>
+              <a:t>03/07/2019</a:t>
             </a:fld>
             <a:endParaRPr lang="en-AT"/>
           </a:p>
@@ -471,7 +472,7 @@
           <a:p>
             <a:fld id="{E7645487-47E7-426D-ABE3-F7B06940B163}" type="datetimeFigureOut">
               <a:rPr lang="en-AT" smtClean="0"/>
-              <a:t>28/06/2019</a:t>
+              <a:t>03/07/2019</a:t>
             </a:fld>
             <a:endParaRPr lang="en-AT"/>
           </a:p>
@@ -681,7 +682,7 @@
           <a:p>
             <a:fld id="{E7645487-47E7-426D-ABE3-F7B06940B163}" type="datetimeFigureOut">
               <a:rPr lang="en-AT" smtClean="0"/>
-              <a:t>28/06/2019</a:t>
+              <a:t>03/07/2019</a:t>
             </a:fld>
             <a:endParaRPr lang="en-AT"/>
           </a:p>
@@ -881,7 +882,7 @@
           <a:p>
             <a:fld id="{E7645487-47E7-426D-ABE3-F7B06940B163}" type="datetimeFigureOut">
               <a:rPr lang="en-AT" smtClean="0"/>
-              <a:t>28/06/2019</a:t>
+              <a:t>03/07/2019</a:t>
             </a:fld>
             <a:endParaRPr lang="en-AT"/>
           </a:p>
@@ -1157,7 +1158,7 @@
           <a:p>
             <a:fld id="{E7645487-47E7-426D-ABE3-F7B06940B163}" type="datetimeFigureOut">
               <a:rPr lang="en-AT" smtClean="0"/>
-              <a:t>28/06/2019</a:t>
+              <a:t>03/07/2019</a:t>
             </a:fld>
             <a:endParaRPr lang="en-AT"/>
           </a:p>
@@ -1425,7 +1426,7 @@
           <a:p>
             <a:fld id="{E7645487-47E7-426D-ABE3-F7B06940B163}" type="datetimeFigureOut">
               <a:rPr lang="en-AT" smtClean="0"/>
-              <a:t>28/06/2019</a:t>
+              <a:t>03/07/2019</a:t>
             </a:fld>
             <a:endParaRPr lang="en-AT"/>
           </a:p>
@@ -1840,7 +1841,7 @@
           <a:p>
             <a:fld id="{E7645487-47E7-426D-ABE3-F7B06940B163}" type="datetimeFigureOut">
               <a:rPr lang="en-AT" smtClean="0"/>
-              <a:t>28/06/2019</a:t>
+              <a:t>03/07/2019</a:t>
             </a:fld>
             <a:endParaRPr lang="en-AT"/>
           </a:p>
@@ -1982,7 +1983,7 @@
           <a:p>
             <a:fld id="{E7645487-47E7-426D-ABE3-F7B06940B163}" type="datetimeFigureOut">
               <a:rPr lang="en-AT" smtClean="0"/>
-              <a:t>28/06/2019</a:t>
+              <a:t>03/07/2019</a:t>
             </a:fld>
             <a:endParaRPr lang="en-AT"/>
           </a:p>
@@ -2095,7 +2096,7 @@
           <a:p>
             <a:fld id="{E7645487-47E7-426D-ABE3-F7B06940B163}" type="datetimeFigureOut">
               <a:rPr lang="en-AT" smtClean="0"/>
-              <a:t>28/06/2019</a:t>
+              <a:t>03/07/2019</a:t>
             </a:fld>
             <a:endParaRPr lang="en-AT"/>
           </a:p>
@@ -2408,7 +2409,7 @@
           <a:p>
             <a:fld id="{E7645487-47E7-426D-ABE3-F7B06940B163}" type="datetimeFigureOut">
               <a:rPr lang="en-AT" smtClean="0"/>
-              <a:t>28/06/2019</a:t>
+              <a:t>03/07/2019</a:t>
             </a:fld>
             <a:endParaRPr lang="en-AT"/>
           </a:p>
@@ -2697,7 +2698,7 @@
           <a:p>
             <a:fld id="{E7645487-47E7-426D-ABE3-F7B06940B163}" type="datetimeFigureOut">
               <a:rPr lang="en-AT" smtClean="0"/>
-              <a:t>28/06/2019</a:t>
+              <a:t>03/07/2019</a:t>
             </a:fld>
             <a:endParaRPr lang="en-AT"/>
           </a:p>
@@ -2940,7 +2941,7 @@
           <a:p>
             <a:fld id="{E7645487-47E7-426D-ABE3-F7B06940B163}" type="datetimeFigureOut">
               <a:rPr lang="en-AT" smtClean="0"/>
-              <a:t>28/06/2019</a:t>
+              <a:t>03/07/2019</a:t>
             </a:fld>
             <a:endParaRPr lang="en-AT"/>
           </a:p>
@@ -3522,7 +3523,7 @@
             </a:br>
             <a:r>
               <a:rPr lang="en-US" sz="3600" dirty="0"/>
-              <a:t>Setup</a:t>
+              <a:t>Preliminary Results</a:t>
             </a:r>
             <a:endParaRPr lang="en-AT" sz="3600" b="1" dirty="0"/>
           </a:p>
@@ -3549,12 +3550,6 @@
           <a:bodyPr/>
           <a:lstStyle/>
           <a:p>
-            <a:pPr marL="0" indent="0">
-              <a:buNone/>
-            </a:pPr>
-            <a:endParaRPr lang="en-US" dirty="0"/>
-          </a:p>
-          <a:p>
             <a:pPr lvl="1"/>
             <a:endParaRPr lang="en-US" dirty="0"/>
           </a:p>
@@ -3572,52 +3567,70 @@
           </a:p>
         </p:txBody>
       </p:sp>
-      <p:sp>
-        <p:nvSpPr>
-          <p:cNvPr id="4" name="TextBox 3">
+      <p:pic>
+        <p:nvPicPr>
+          <p:cNvPr id="4" name="Picture 3">
             <a:extLst>
               <a:ext uri="{FF2B5EF4-FFF2-40B4-BE49-F238E27FC236}">
-                <a16:creationId xmlns:a16="http://schemas.microsoft.com/office/drawing/2014/main" id="{391783B1-0DAE-40D3-8BBF-9FC24E30E7E0}"/>
+                <a16:creationId xmlns:a16="http://schemas.microsoft.com/office/drawing/2014/main" id="{23A5E029-D7ED-42EC-A811-2CF07FC281B8}"/>
               </a:ext>
             </a:extLst>
           </p:cNvPr>
-          <p:cNvSpPr txBox="1"/>
+          <p:cNvPicPr>
+            <a:picLocks noChangeAspect="1"/>
+          </p:cNvPicPr>
           <p:nvPr/>
-        </p:nvSpPr>
+        </p:nvPicPr>
+        <p:blipFill>
+          <a:blip r:embed="rId2"/>
+          <a:stretch>
+            <a:fillRect/>
+          </a:stretch>
+        </p:blipFill>
         <p:spPr>
           <a:xfrm>
-            <a:off x="4286774" y="2969703"/>
-            <a:ext cx="2306973" cy="369332"/>
+            <a:off x="297111" y="2172494"/>
+            <a:ext cx="5446353" cy="3657600"/>
           </a:xfrm>
           <a:prstGeom prst="rect">
             <a:avLst/>
           </a:prstGeom>
-          <a:noFill/>
         </p:spPr>
-        <p:txBody>
-          <a:bodyPr wrap="square" rtlCol="0">
-            <a:spAutoFit/>
-          </a:bodyPr>
-          <a:lstStyle/>
-          <a:p>
-            <a:r>
-              <a:rPr lang="en-US" dirty="0">
-                <a:latin typeface="Times New Roman" panose="02020603050405020304" pitchFamily="18" charset="0"/>
-                <a:cs typeface="Times New Roman" panose="02020603050405020304" pitchFamily="18" charset="0"/>
-              </a:rPr>
-              <a:t>IO6tmZ5q</a:t>
-            </a:r>
-            <a:endParaRPr lang="en-AT" dirty="0">
-              <a:latin typeface="Times New Roman" panose="02020603050405020304" pitchFamily="18" charset="0"/>
-              <a:cs typeface="Times New Roman" panose="02020603050405020304" pitchFamily="18" charset="0"/>
-            </a:endParaRPr>
-          </a:p>
-        </p:txBody>
-      </p:sp>
+      </p:pic>
+      <p:pic>
+        <p:nvPicPr>
+          <p:cNvPr id="5" name="Picture 4">
+            <a:extLst>
+              <a:ext uri="{FF2B5EF4-FFF2-40B4-BE49-F238E27FC236}">
+                <a16:creationId xmlns:a16="http://schemas.microsoft.com/office/drawing/2014/main" id="{C2C53A90-7140-49B0-9170-F0F60C926106}"/>
+              </a:ext>
+            </a:extLst>
+          </p:cNvPr>
+          <p:cNvPicPr>
+            <a:picLocks noChangeAspect="1"/>
+          </p:cNvPicPr>
+          <p:nvPr/>
+        </p:nvPicPr>
+        <p:blipFill>
+          <a:blip r:embed="rId3"/>
+          <a:stretch>
+            <a:fillRect/>
+          </a:stretch>
+        </p:blipFill>
+        <p:spPr>
+          <a:xfrm>
+            <a:off x="6096000" y="2172494"/>
+            <a:ext cx="5413248" cy="3657600"/>
+          </a:xfrm>
+          <a:prstGeom prst="rect">
+            <a:avLst/>
+          </a:prstGeom>
+        </p:spPr>
+      </p:pic>
     </p:spTree>
     <p:extLst>
       <p:ext uri="{BB962C8B-B14F-4D97-AF65-F5344CB8AC3E}">
-        <p14:creationId xmlns:p14="http://schemas.microsoft.com/office/powerpoint/2010/main" val="3628183441"/>
+        <p14:creationId xmlns:p14="http://schemas.microsoft.com/office/powerpoint/2010/main" val="2489244246"/>
       </p:ext>
     </p:extLst>
   </p:cSld>
@@ -3676,7 +3689,7 @@
             </a:br>
             <a:r>
               <a:rPr lang="en-US" sz="3600" dirty="0"/>
-              <a:t>Preliminary Results</a:t>
+              <a:t>Preliminary Results (p &lt; 0.1)</a:t>
             </a:r>
             <a:endParaRPr lang="en-AT" sz="3600" b="1" dirty="0"/>
           </a:p>
@@ -3720,10 +3733,198 @@
           </a:p>
         </p:txBody>
       </p:sp>
+      <p:pic>
+        <p:nvPicPr>
+          <p:cNvPr id="6" name="Picture 5">
+            <a:extLst>
+              <a:ext uri="{FF2B5EF4-FFF2-40B4-BE49-F238E27FC236}">
+                <a16:creationId xmlns:a16="http://schemas.microsoft.com/office/drawing/2014/main" id="{2BB11C61-D121-4EEA-AF61-9244B2DB352C}"/>
+              </a:ext>
+            </a:extLst>
+          </p:cNvPr>
+          <p:cNvPicPr>
+            <a:picLocks noChangeAspect="1"/>
+          </p:cNvPicPr>
+          <p:nvPr/>
+        </p:nvPicPr>
+        <p:blipFill>
+          <a:blip r:embed="rId2"/>
+          <a:stretch>
+            <a:fillRect/>
+          </a:stretch>
+        </p:blipFill>
+        <p:spPr>
+          <a:xfrm>
+            <a:off x="354478" y="2172494"/>
+            <a:ext cx="5393297" cy="3657600"/>
+          </a:xfrm>
+          <a:prstGeom prst="rect">
+            <a:avLst/>
+          </a:prstGeom>
+        </p:spPr>
+      </p:pic>
+      <p:pic>
+        <p:nvPicPr>
+          <p:cNvPr id="7" name="Picture 6">
+            <a:extLst>
+              <a:ext uri="{FF2B5EF4-FFF2-40B4-BE49-F238E27FC236}">
+                <a16:creationId xmlns:a16="http://schemas.microsoft.com/office/drawing/2014/main" id="{6385D2E0-E12F-4269-976F-2832E57CA3A0}"/>
+              </a:ext>
+            </a:extLst>
+          </p:cNvPr>
+          <p:cNvPicPr>
+            <a:picLocks noChangeAspect="1"/>
+          </p:cNvPicPr>
+          <p:nvPr/>
+        </p:nvPicPr>
+        <p:blipFill>
+          <a:blip r:embed="rId3"/>
+          <a:stretch>
+            <a:fillRect/>
+          </a:stretch>
+        </p:blipFill>
+        <p:spPr>
+          <a:xfrm>
+            <a:off x="6051259" y="2178786"/>
+            <a:ext cx="5409503" cy="3657600"/>
+          </a:xfrm>
+          <a:prstGeom prst="rect">
+            <a:avLst/>
+          </a:prstGeom>
+        </p:spPr>
+      </p:pic>
     </p:spTree>
     <p:extLst>
       <p:ext uri="{BB962C8B-B14F-4D97-AF65-F5344CB8AC3E}">
-        <p14:creationId xmlns:p14="http://schemas.microsoft.com/office/powerpoint/2010/main" val="2489244246"/>
+        <p14:creationId xmlns:p14="http://schemas.microsoft.com/office/powerpoint/2010/main" val="1702334560"/>
+      </p:ext>
+    </p:extLst>
+  </p:cSld>
+  <p:clrMapOvr>
+    <a:masterClrMapping/>
+  </p:clrMapOvr>
+</p:sld>
+</file>
+
+<file path=ppt/slides/slide12.xml><?xml version="1.0" encoding="utf-8"?>
+<p:sld xmlns:a="http://schemas.openxmlformats.org/drawingml/2006/main" xmlns:r="http://schemas.openxmlformats.org/officeDocument/2006/relationships" xmlns:p="http://schemas.openxmlformats.org/presentationml/2006/main">
+  <p:cSld>
+    <p:spTree>
+      <p:nvGrpSpPr>
+        <p:cNvPr id="1" name=""/>
+        <p:cNvGrpSpPr/>
+        <p:nvPr/>
+      </p:nvGrpSpPr>
+      <p:grpSpPr>
+        <a:xfrm>
+          <a:off x="0" y="0"/>
+          <a:ext cx="0" cy="0"/>
+          <a:chOff x="0" y="0"/>
+          <a:chExt cx="0" cy="0"/>
+        </a:xfrm>
+      </p:grpSpPr>
+      <p:sp>
+        <p:nvSpPr>
+          <p:cNvPr id="2" name="Title 1">
+            <a:extLst>
+              <a:ext uri="{FF2B5EF4-FFF2-40B4-BE49-F238E27FC236}">
+                <a16:creationId xmlns:a16="http://schemas.microsoft.com/office/drawing/2014/main" id="{44BAFED9-EFDD-496C-AE06-7B243C842CAC}"/>
+              </a:ext>
+            </a:extLst>
+          </p:cNvPr>
+          <p:cNvSpPr>
+            <a:spLocks noGrp="1"/>
+          </p:cNvSpPr>
+          <p:nvPr>
+            <p:ph type="title"/>
+          </p:nvPr>
+        </p:nvSpPr>
+        <p:spPr/>
+        <p:txBody>
+          <a:bodyPr>
+            <a:normAutofit/>
+          </a:bodyPr>
+          <a:lstStyle/>
+          <a:p>
+            <a:r>
+              <a:rPr lang="en-US" sz="3600" b="1" dirty="0"/>
+              <a:t>Regression analysis</a:t>
+            </a:r>
+            <a:br>
+              <a:rPr lang="en-US" sz="3600" b="1" dirty="0"/>
+            </a:br>
+            <a:r>
+              <a:rPr lang="en-US" sz="3600" dirty="0"/>
+              <a:t>Building parameters for variable cost</a:t>
+            </a:r>
+            <a:endParaRPr lang="en-AT" sz="3600" dirty="0"/>
+          </a:p>
+        </p:txBody>
+      </p:sp>
+      <p:pic>
+        <p:nvPicPr>
+          <p:cNvPr id="4" name="Picture 3">
+            <a:extLst>
+              <a:ext uri="{FF2B5EF4-FFF2-40B4-BE49-F238E27FC236}">
+                <a16:creationId xmlns:a16="http://schemas.microsoft.com/office/drawing/2014/main" id="{A37C3CCC-4569-4099-90F9-90FC585E9D81}"/>
+              </a:ext>
+            </a:extLst>
+          </p:cNvPr>
+          <p:cNvPicPr>
+            <a:picLocks noChangeAspect="1"/>
+          </p:cNvPicPr>
+          <p:nvPr/>
+        </p:nvPicPr>
+        <p:blipFill>
+          <a:blip r:embed="rId2"/>
+          <a:stretch>
+            <a:fillRect/>
+          </a:stretch>
+        </p:blipFill>
+        <p:spPr>
+          <a:xfrm>
+            <a:off x="181409" y="1920875"/>
+            <a:ext cx="6762230" cy="4572000"/>
+          </a:xfrm>
+          <a:prstGeom prst="rect">
+            <a:avLst/>
+          </a:prstGeom>
+        </p:spPr>
+      </p:pic>
+      <p:pic>
+        <p:nvPicPr>
+          <p:cNvPr id="5" name="Picture 4">
+            <a:extLst>
+              <a:ext uri="{FF2B5EF4-FFF2-40B4-BE49-F238E27FC236}">
+                <a16:creationId xmlns:a16="http://schemas.microsoft.com/office/drawing/2014/main" id="{B4359B1A-F863-4316-BF5D-F58B37B0110A}"/>
+              </a:ext>
+            </a:extLst>
+          </p:cNvPr>
+          <p:cNvPicPr>
+            <a:picLocks noChangeAspect="1"/>
+          </p:cNvPicPr>
+          <p:nvPr/>
+        </p:nvPicPr>
+        <p:blipFill>
+          <a:blip r:embed="rId3"/>
+          <a:stretch>
+            <a:fillRect/>
+          </a:stretch>
+        </p:blipFill>
+        <p:spPr>
+          <a:xfrm>
+            <a:off x="7134575" y="3316099"/>
+            <a:ext cx="4755875" cy="1371600"/>
+          </a:xfrm>
+          <a:prstGeom prst="rect">
+            <a:avLst/>
+          </a:prstGeom>
+        </p:spPr>
+      </p:pic>
+    </p:spTree>
+    <p:extLst>
+      <p:ext uri="{BB962C8B-B14F-4D97-AF65-F5344CB8AC3E}">
+        <p14:creationId xmlns:p14="http://schemas.microsoft.com/office/powerpoint/2010/main" val="3060646669"/>
       </p:ext>
     </p:extLst>
   </p:cSld>
@@ -3839,6 +4040,18 @@
             <a:r>
               <a:rPr lang="en-US" dirty="0"/>
               <a:t>Sources: World Trade Organization, Uppsala University</a:t>
+            </a:r>
+          </a:p>
+          <a:p>
+            <a:r>
+              <a:rPr lang="en-US" dirty="0"/>
+              <a:t>Built parameters for bilateral trade to substitute into MESSAGE</a:t>
+            </a:r>
+          </a:p>
+          <a:p>
+            <a:r>
+              <a:rPr lang="en-US" dirty="0"/>
+              <a:t>Ran regression to get the variable cost parameter in MESSAGE</a:t>
             </a:r>
           </a:p>
           <a:p>
@@ -12127,7 +12340,7 @@
         </p:nvGrpSpPr>
         <p:grpSpPr>
           <a:xfrm>
-            <a:off x="4712027" y="3375339"/>
+            <a:off x="8696160" y="5022116"/>
             <a:ext cx="3034872" cy="1418039"/>
             <a:chOff x="1009645" y="1431131"/>
             <a:chExt cx="3034872" cy="1418039"/>
@@ -12985,7 +13198,7 @@
         </p:nvGrpSpPr>
         <p:grpSpPr>
           <a:xfrm>
-            <a:off x="4712027" y="5010727"/>
+            <a:off x="4817402" y="3394160"/>
             <a:ext cx="3034872" cy="1418039"/>
             <a:chOff x="1009645" y="1431131"/>
             <a:chExt cx="3034872" cy="1418039"/>
@@ -13196,7 +13409,7 @@
             <a:p>
               <a:r>
                 <a:rPr lang="en-US" dirty="0"/>
-                <a:t>Liquid oil</a:t>
+                <a:t>Light oil</a:t>
               </a:r>
             </a:p>
             <a:p>
@@ -13549,6 +13762,266 @@
           </p:txBody>
         </p:sp>
       </p:grpSp>
+      <p:sp>
+        <p:nvSpPr>
+          <p:cNvPr id="3" name="Rectangle 2">
+            <a:extLst>
+              <a:ext uri="{FF2B5EF4-FFF2-40B4-BE49-F238E27FC236}">
+                <a16:creationId xmlns:a16="http://schemas.microsoft.com/office/drawing/2014/main" id="{9664BA31-E726-44D1-B636-943F5FB39A23}"/>
+              </a:ext>
+            </a:extLst>
+          </p:cNvPr>
+          <p:cNvSpPr/>
+          <p:nvPr/>
+        </p:nvSpPr>
+        <p:spPr>
+          <a:xfrm>
+            <a:off x="779306" y="1679554"/>
+            <a:ext cx="3709184" cy="1611092"/>
+          </a:xfrm>
+          <a:prstGeom prst="rect">
+            <a:avLst/>
+          </a:prstGeom>
+          <a:noFill/>
+          <a:ln w="38100">
+            <a:solidFill>
+              <a:schemeClr val="accent1"/>
+            </a:solidFill>
+          </a:ln>
+        </p:spPr>
+        <p:style>
+          <a:lnRef idx="2">
+            <a:schemeClr val="accent1">
+              <a:shade val="50000"/>
+            </a:schemeClr>
+          </a:lnRef>
+          <a:fillRef idx="1">
+            <a:schemeClr val="accent1"/>
+          </a:fillRef>
+          <a:effectRef idx="0">
+            <a:schemeClr val="accent1"/>
+          </a:effectRef>
+          <a:fontRef idx="minor">
+            <a:schemeClr val="lt1"/>
+          </a:fontRef>
+        </p:style>
+        <p:txBody>
+          <a:bodyPr rtlCol="0" anchor="ctr"/>
+          <a:lstStyle/>
+          <a:p>
+            <a:pPr algn="ctr"/>
+            <a:endParaRPr lang="en-AT"/>
+          </a:p>
+        </p:txBody>
+      </p:sp>
+      <p:sp>
+        <p:nvSpPr>
+          <p:cNvPr id="63" name="Rectangle 62">
+            <a:extLst>
+              <a:ext uri="{FF2B5EF4-FFF2-40B4-BE49-F238E27FC236}">
+                <a16:creationId xmlns:a16="http://schemas.microsoft.com/office/drawing/2014/main" id="{1958D723-B719-44B9-89EF-635947C6EB2F}"/>
+              </a:ext>
+            </a:extLst>
+          </p:cNvPr>
+          <p:cNvSpPr/>
+          <p:nvPr/>
+        </p:nvSpPr>
+        <p:spPr>
+          <a:xfrm>
+            <a:off x="779306" y="3306109"/>
+            <a:ext cx="3709184" cy="1611092"/>
+          </a:xfrm>
+          <a:prstGeom prst="rect">
+            <a:avLst/>
+          </a:prstGeom>
+          <a:noFill/>
+          <a:ln w="38100">
+            <a:solidFill>
+              <a:schemeClr val="accent1"/>
+            </a:solidFill>
+          </a:ln>
+        </p:spPr>
+        <p:style>
+          <a:lnRef idx="2">
+            <a:schemeClr val="accent1">
+              <a:shade val="50000"/>
+            </a:schemeClr>
+          </a:lnRef>
+          <a:fillRef idx="1">
+            <a:schemeClr val="accent1"/>
+          </a:fillRef>
+          <a:effectRef idx="0">
+            <a:schemeClr val="accent1"/>
+          </a:effectRef>
+          <a:fontRef idx="minor">
+            <a:schemeClr val="lt1"/>
+          </a:fontRef>
+        </p:style>
+        <p:txBody>
+          <a:bodyPr rtlCol="0" anchor="ctr"/>
+          <a:lstStyle/>
+          <a:p>
+            <a:pPr algn="ctr"/>
+            <a:endParaRPr lang="en-AT"/>
+          </a:p>
+        </p:txBody>
+      </p:sp>
+      <p:sp>
+        <p:nvSpPr>
+          <p:cNvPr id="64" name="Rectangle 63">
+            <a:extLst>
+              <a:ext uri="{FF2B5EF4-FFF2-40B4-BE49-F238E27FC236}">
+                <a16:creationId xmlns:a16="http://schemas.microsoft.com/office/drawing/2014/main" id="{AD918656-2557-438E-8C21-EDE9FF806F8A}"/>
+              </a:ext>
+            </a:extLst>
+          </p:cNvPr>
+          <p:cNvSpPr/>
+          <p:nvPr/>
+        </p:nvSpPr>
+        <p:spPr>
+          <a:xfrm>
+            <a:off x="779306" y="4929803"/>
+            <a:ext cx="3709184" cy="1611092"/>
+          </a:xfrm>
+          <a:prstGeom prst="rect">
+            <a:avLst/>
+          </a:prstGeom>
+          <a:noFill/>
+          <a:ln w="38100">
+            <a:solidFill>
+              <a:schemeClr val="accent1"/>
+            </a:solidFill>
+          </a:ln>
+        </p:spPr>
+        <p:style>
+          <a:lnRef idx="2">
+            <a:schemeClr val="accent1">
+              <a:shade val="50000"/>
+            </a:schemeClr>
+          </a:lnRef>
+          <a:fillRef idx="1">
+            <a:schemeClr val="accent1"/>
+          </a:fillRef>
+          <a:effectRef idx="0">
+            <a:schemeClr val="accent1"/>
+          </a:effectRef>
+          <a:fontRef idx="minor">
+            <a:schemeClr val="lt1"/>
+          </a:fontRef>
+        </p:style>
+        <p:txBody>
+          <a:bodyPr rtlCol="0" anchor="ctr"/>
+          <a:lstStyle/>
+          <a:p>
+            <a:pPr algn="ctr"/>
+            <a:endParaRPr lang="en-AT"/>
+          </a:p>
+        </p:txBody>
+      </p:sp>
+      <p:sp>
+        <p:nvSpPr>
+          <p:cNvPr id="65" name="Rectangle 64">
+            <a:extLst>
+              <a:ext uri="{FF2B5EF4-FFF2-40B4-BE49-F238E27FC236}">
+                <a16:creationId xmlns:a16="http://schemas.microsoft.com/office/drawing/2014/main" id="{FC64B592-FE10-4540-A7C9-B5C1A775A76D}"/>
+              </a:ext>
+            </a:extLst>
+          </p:cNvPr>
+          <p:cNvSpPr/>
+          <p:nvPr/>
+        </p:nvSpPr>
+        <p:spPr>
+          <a:xfrm>
+            <a:off x="4499145" y="3303127"/>
+            <a:ext cx="3709184" cy="1611092"/>
+          </a:xfrm>
+          <a:prstGeom prst="rect">
+            <a:avLst/>
+          </a:prstGeom>
+          <a:noFill/>
+          <a:ln w="38100">
+            <a:solidFill>
+              <a:schemeClr val="accent1"/>
+            </a:solidFill>
+          </a:ln>
+        </p:spPr>
+        <p:style>
+          <a:lnRef idx="2">
+            <a:schemeClr val="accent1">
+              <a:shade val="50000"/>
+            </a:schemeClr>
+          </a:lnRef>
+          <a:fillRef idx="1">
+            <a:schemeClr val="accent1"/>
+          </a:fillRef>
+          <a:effectRef idx="0">
+            <a:schemeClr val="accent1"/>
+          </a:effectRef>
+          <a:fontRef idx="minor">
+            <a:schemeClr val="lt1"/>
+          </a:fontRef>
+        </p:style>
+        <p:txBody>
+          <a:bodyPr rtlCol="0" anchor="ctr"/>
+          <a:lstStyle/>
+          <a:p>
+            <a:pPr algn="ctr"/>
+            <a:endParaRPr lang="en-AT"/>
+          </a:p>
+        </p:txBody>
+      </p:sp>
+      <p:sp>
+        <p:nvSpPr>
+          <p:cNvPr id="66" name="Rectangle 65">
+            <a:extLst>
+              <a:ext uri="{FF2B5EF4-FFF2-40B4-BE49-F238E27FC236}">
+                <a16:creationId xmlns:a16="http://schemas.microsoft.com/office/drawing/2014/main" id="{5ECE5601-55CD-492D-A195-31BF68F89ACE}"/>
+              </a:ext>
+            </a:extLst>
+          </p:cNvPr>
+          <p:cNvSpPr/>
+          <p:nvPr/>
+        </p:nvSpPr>
+        <p:spPr>
+          <a:xfrm>
+            <a:off x="4480246" y="1679554"/>
+            <a:ext cx="3709184" cy="1611092"/>
+          </a:xfrm>
+          <a:prstGeom prst="rect">
+            <a:avLst/>
+          </a:prstGeom>
+          <a:noFill/>
+          <a:ln w="38100">
+            <a:solidFill>
+              <a:schemeClr val="accent1"/>
+            </a:solidFill>
+          </a:ln>
+        </p:spPr>
+        <p:style>
+          <a:lnRef idx="2">
+            <a:schemeClr val="accent1">
+              <a:shade val="50000"/>
+            </a:schemeClr>
+          </a:lnRef>
+          <a:fillRef idx="1">
+            <a:schemeClr val="accent1"/>
+          </a:fillRef>
+          <a:effectRef idx="0">
+            <a:schemeClr val="accent1"/>
+          </a:effectRef>
+          <a:fontRef idx="minor">
+            <a:schemeClr val="lt1"/>
+          </a:fontRef>
+        </p:style>
+        <p:txBody>
+          <a:bodyPr rtlCol="0" anchor="ctr"/>
+          <a:lstStyle/>
+          <a:p>
+            <a:pPr algn="ctr"/>
+            <a:endParaRPr lang="en-AT"/>
+          </a:p>
+        </p:txBody>
+      </p:sp>
     </p:spTree>
     <p:extLst>
       <p:ext uri="{BB962C8B-B14F-4D97-AF65-F5344CB8AC3E}">
@@ -14395,7 +14868,7 @@
           <p:cNvPr id="2" name="Title 1">
             <a:extLst>
               <a:ext uri="{FF2B5EF4-FFF2-40B4-BE49-F238E27FC236}">
-                <a16:creationId xmlns:a16="http://schemas.microsoft.com/office/drawing/2014/main" id="{7F497429-F8E1-451C-B6CC-5CB9761515B2}"/>
+                <a16:creationId xmlns:a16="http://schemas.microsoft.com/office/drawing/2014/main" id="{978904D6-0100-4648-8806-A8B3758832F3}"/>
               </a:ext>
             </a:extLst>
           </p:cNvPr>
@@ -14408,38 +14881,735 @@
         </p:nvSpPr>
         <p:spPr/>
         <p:txBody>
+          <a:bodyPr/>
+          <a:lstStyle/>
+          <a:p>
+            <a:r>
+              <a:rPr lang="en-US" b="1" dirty="0"/>
+              <a:t>Disaggregating parameters</a:t>
+            </a:r>
+            <a:br>
+              <a:rPr lang="en-US" b="1" dirty="0"/>
+            </a:br>
+            <a:r>
+              <a:rPr lang="en-US" dirty="0"/>
+              <a:t>Setup</a:t>
+            </a:r>
+            <a:endParaRPr lang="en-AT" dirty="0"/>
+          </a:p>
+        </p:txBody>
+      </p:sp>
+      <p:sp>
+        <p:nvSpPr>
+          <p:cNvPr id="3" name="Content Placeholder 2">
+            <a:extLst>
+              <a:ext uri="{FF2B5EF4-FFF2-40B4-BE49-F238E27FC236}">
+                <a16:creationId xmlns:a16="http://schemas.microsoft.com/office/drawing/2014/main" id="{4D64CDF4-57A6-4CC5-AEF4-E173D55DDDEF}"/>
+              </a:ext>
+            </a:extLst>
+          </p:cNvPr>
+          <p:cNvSpPr>
+            <a:spLocks noGrp="1"/>
+          </p:cNvSpPr>
+          <p:nvPr>
+            <p:ph idx="1"/>
+          </p:nvPr>
+        </p:nvSpPr>
+        <p:spPr>
+          <a:xfrm>
+            <a:off x="838200" y="1825624"/>
+            <a:ext cx="5378042" cy="4860401"/>
+          </a:xfrm>
+        </p:spPr>
+        <p:txBody>
           <a:bodyPr>
             <a:normAutofit/>
           </a:bodyPr>
           <a:lstStyle/>
           <a:p>
+            <a:pPr marL="0" indent="0">
+              <a:buNone/>
+            </a:pPr>
             <a:r>
-              <a:rPr lang="en-US" sz="3600" b="1" dirty="0"/>
-              <a:t>Disaggregating parameters</a:t>
+              <a:rPr lang="en-US" sz="1800" b="1" dirty="0"/>
+              <a:t>Constant value:</a:t>
             </a:r>
-            <a:br>
-              <a:rPr lang="en-US" sz="3600" b="1" dirty="0"/>
-            </a:br>
+          </a:p>
+          <a:p>
             <a:r>
-              <a:rPr lang="en-US" sz="3600" dirty="0" err="1"/>
+              <a:rPr lang="en-US" sz="1800" dirty="0" err="1"/>
+              <a:t>capacity_factor</a:t>
+            </a:r>
+            <a:endParaRPr lang="en-US" sz="1800" dirty="0"/>
+          </a:p>
+          <a:p>
+            <a:r>
+              <a:rPr lang="en-US" sz="1800" dirty="0" err="1"/>
+              <a:t>growth_activity_lo</a:t>
+            </a:r>
+            <a:r>
+              <a:rPr lang="en-US" sz="1800" dirty="0"/>
+              <a:t>, </a:t>
+            </a:r>
+            <a:r>
+              <a:rPr lang="en-US" sz="1800" dirty="0" err="1"/>
+              <a:t>growth_activity_up</a:t>
+            </a:r>
+            <a:endParaRPr lang="en-US" sz="1800" dirty="0"/>
+          </a:p>
+          <a:p>
+            <a:r>
+              <a:rPr lang="en-US" sz="1800" dirty="0" err="1"/>
+              <a:t>initial_activity_lo</a:t>
+            </a:r>
+            <a:r>
+              <a:rPr lang="en-US" sz="1800" dirty="0"/>
+              <a:t>, </a:t>
+            </a:r>
+            <a:r>
+              <a:rPr lang="en-US" sz="1800" dirty="0" err="1"/>
+              <a:t>initial_activity_up</a:t>
+            </a:r>
+            <a:endParaRPr lang="en-US" sz="1800" dirty="0"/>
+          </a:p>
+          <a:p>
+            <a:r>
+              <a:rPr lang="en-US" sz="1800" dirty="0"/>
+              <a:t>input, output</a:t>
+            </a:r>
+          </a:p>
+          <a:p>
+            <a:r>
+              <a:rPr lang="en-US" sz="1800" dirty="0" err="1"/>
+              <a:t>level_cost_activity_soft_lo</a:t>
+            </a:r>
+            <a:r>
+              <a:rPr lang="en-US" sz="1800" dirty="0"/>
+              <a:t>, </a:t>
+            </a:r>
+            <a:r>
+              <a:rPr lang="en-US" sz="1800" dirty="0" err="1"/>
+              <a:t>level_cost_activity_up</a:t>
+            </a:r>
+            <a:r>
+              <a:rPr lang="en-US" sz="1800" dirty="0"/>
+              <a:t> </a:t>
+            </a:r>
+          </a:p>
+          <a:p>
+            <a:r>
+              <a:rPr lang="en-US" sz="1800" dirty="0" err="1"/>
+              <a:t>soft_activity_lo</a:t>
+            </a:r>
+            <a:r>
+              <a:rPr lang="en-US" sz="1800" dirty="0"/>
+              <a:t>, </a:t>
+            </a:r>
+            <a:r>
+              <a:rPr lang="en-US" sz="1800" dirty="0" err="1"/>
+              <a:t>soft_activity_up</a:t>
+            </a:r>
+            <a:endParaRPr lang="en-US" sz="1800" dirty="0"/>
+          </a:p>
+          <a:p>
+            <a:r>
+              <a:rPr lang="en-US" sz="1800" dirty="0" err="1"/>
+              <a:t>technical_lifetime</a:t>
+            </a:r>
+            <a:endParaRPr lang="en-US" sz="1800" dirty="0"/>
+          </a:p>
+          <a:p>
+            <a:pPr marL="0" indent="0">
+              <a:buNone/>
+            </a:pPr>
+            <a:endParaRPr lang="en-US" sz="1800" dirty="0"/>
+          </a:p>
+          <a:p>
+            <a:pPr marL="0" indent="0">
+              <a:buNone/>
+            </a:pPr>
+            <a:r>
+              <a:rPr lang="en-US" sz="1800" b="1" dirty="0"/>
+              <a:t>Requires scaling based on trade data:</a:t>
+            </a:r>
+          </a:p>
+          <a:p>
+            <a:r>
+              <a:rPr lang="en-US" sz="1800" dirty="0" err="1"/>
+              <a:t>historical_activity</a:t>
+            </a:r>
+            <a:endParaRPr lang="en-US" sz="1800" dirty="0"/>
+          </a:p>
+          <a:p>
+            <a:r>
+              <a:rPr lang="en-US" sz="1800" dirty="0" err="1"/>
               <a:t>bound_activity_lo</a:t>
             </a:r>
             <a:r>
-              <a:rPr lang="en-US" sz="3600" dirty="0"/>
-              <a:t> + </a:t>
+              <a:rPr lang="en-US" sz="1800" dirty="0"/>
+              <a:t>, </a:t>
             </a:r>
             <a:r>
-              <a:rPr lang="en-US" sz="3600" dirty="0" err="1"/>
+              <a:rPr lang="en-US" sz="1800" dirty="0" err="1"/>
               <a:t>bound_activity_up</a:t>
             </a:r>
-            <a:endParaRPr lang="en-AT" sz="3600" b="1" dirty="0"/>
+            <a:endParaRPr lang="en-US" sz="1800" dirty="0"/>
+          </a:p>
+        </p:txBody>
+      </p:sp>
+      <p:sp>
+        <p:nvSpPr>
+          <p:cNvPr id="4" name="Content Placeholder 2">
+            <a:extLst>
+              <a:ext uri="{FF2B5EF4-FFF2-40B4-BE49-F238E27FC236}">
+                <a16:creationId xmlns:a16="http://schemas.microsoft.com/office/drawing/2014/main" id="{C7C736ED-FCF6-4379-B8B9-BFE6769B7AF9}"/>
+              </a:ext>
+            </a:extLst>
+          </p:cNvPr>
+          <p:cNvSpPr txBox="1">
+            <a:spLocks/>
+          </p:cNvSpPr>
+          <p:nvPr/>
+        </p:nvSpPr>
+        <p:spPr>
+          <a:xfrm>
+            <a:off x="6544112" y="1825624"/>
+            <a:ext cx="5069048" cy="4725465"/>
+          </a:xfrm>
+          <a:prstGeom prst="rect">
+            <a:avLst/>
+          </a:prstGeom>
+        </p:spPr>
+        <p:txBody>
+          <a:bodyPr vert="horz" lIns="91440" tIns="45720" rIns="91440" bIns="45720" rtlCol="0">
+            <a:normAutofit/>
+          </a:bodyPr>
+          <a:lstStyle>
+            <a:lvl1pPr marL="228600" indent="-228600" algn="l" defTabSz="914400" rtl="0" eaLnBrk="1" latinLnBrk="0" hangingPunct="1">
+              <a:lnSpc>
+                <a:spcPct val="90000"/>
+              </a:lnSpc>
+              <a:spcBef>
+                <a:spcPts val="1000"/>
+              </a:spcBef>
+              <a:buFont typeface="Arial" panose="020B0604020202020204" pitchFamily="34" charset="0"/>
+              <a:buChar char="•"/>
+              <a:defRPr sz="2800" kern="1200">
+                <a:solidFill>
+                  <a:schemeClr val="tx1"/>
+                </a:solidFill>
+                <a:latin typeface="+mn-lt"/>
+                <a:ea typeface="+mn-ea"/>
+                <a:cs typeface="+mn-cs"/>
+              </a:defRPr>
+            </a:lvl1pPr>
+            <a:lvl2pPr marL="685800" indent="-228600" algn="l" defTabSz="914400" rtl="0" eaLnBrk="1" latinLnBrk="0" hangingPunct="1">
+              <a:lnSpc>
+                <a:spcPct val="90000"/>
+              </a:lnSpc>
+              <a:spcBef>
+                <a:spcPts val="500"/>
+              </a:spcBef>
+              <a:buFont typeface="Arial" panose="020B0604020202020204" pitchFamily="34" charset="0"/>
+              <a:buChar char="•"/>
+              <a:defRPr sz="2400" kern="1200">
+                <a:solidFill>
+                  <a:schemeClr val="tx1"/>
+                </a:solidFill>
+                <a:latin typeface="+mn-lt"/>
+                <a:ea typeface="+mn-ea"/>
+                <a:cs typeface="+mn-cs"/>
+              </a:defRPr>
+            </a:lvl2pPr>
+            <a:lvl3pPr marL="1143000" indent="-228600" algn="l" defTabSz="914400" rtl="0" eaLnBrk="1" latinLnBrk="0" hangingPunct="1">
+              <a:lnSpc>
+                <a:spcPct val="90000"/>
+              </a:lnSpc>
+              <a:spcBef>
+                <a:spcPts val="500"/>
+              </a:spcBef>
+              <a:buFont typeface="Arial" panose="020B0604020202020204" pitchFamily="34" charset="0"/>
+              <a:buChar char="•"/>
+              <a:defRPr sz="2000" kern="1200">
+                <a:solidFill>
+                  <a:schemeClr val="tx1"/>
+                </a:solidFill>
+                <a:latin typeface="+mn-lt"/>
+                <a:ea typeface="+mn-ea"/>
+                <a:cs typeface="+mn-cs"/>
+              </a:defRPr>
+            </a:lvl3pPr>
+            <a:lvl4pPr marL="1600200" indent="-228600" algn="l" defTabSz="914400" rtl="0" eaLnBrk="1" latinLnBrk="0" hangingPunct="1">
+              <a:lnSpc>
+                <a:spcPct val="90000"/>
+              </a:lnSpc>
+              <a:spcBef>
+                <a:spcPts val="500"/>
+              </a:spcBef>
+              <a:buFont typeface="Arial" panose="020B0604020202020204" pitchFamily="34" charset="0"/>
+              <a:buChar char="•"/>
+              <a:defRPr sz="1800" kern="1200">
+                <a:solidFill>
+                  <a:schemeClr val="tx1"/>
+                </a:solidFill>
+                <a:latin typeface="+mn-lt"/>
+                <a:ea typeface="+mn-ea"/>
+                <a:cs typeface="+mn-cs"/>
+              </a:defRPr>
+            </a:lvl4pPr>
+            <a:lvl5pPr marL="2057400" indent="-228600" algn="l" defTabSz="914400" rtl="0" eaLnBrk="1" latinLnBrk="0" hangingPunct="1">
+              <a:lnSpc>
+                <a:spcPct val="90000"/>
+              </a:lnSpc>
+              <a:spcBef>
+                <a:spcPts val="500"/>
+              </a:spcBef>
+              <a:buFont typeface="Arial" panose="020B0604020202020204" pitchFamily="34" charset="0"/>
+              <a:buChar char="•"/>
+              <a:defRPr sz="1800" kern="1200">
+                <a:solidFill>
+                  <a:schemeClr val="tx1"/>
+                </a:solidFill>
+                <a:latin typeface="+mn-lt"/>
+                <a:ea typeface="+mn-ea"/>
+                <a:cs typeface="+mn-cs"/>
+              </a:defRPr>
+            </a:lvl5pPr>
+            <a:lvl6pPr marL="2514600" indent="-228600" algn="l" defTabSz="914400" rtl="0" eaLnBrk="1" latinLnBrk="0" hangingPunct="1">
+              <a:lnSpc>
+                <a:spcPct val="90000"/>
+              </a:lnSpc>
+              <a:spcBef>
+                <a:spcPts val="500"/>
+              </a:spcBef>
+              <a:buFont typeface="Arial" panose="020B0604020202020204" pitchFamily="34" charset="0"/>
+              <a:buChar char="•"/>
+              <a:defRPr sz="1800" kern="1200">
+                <a:solidFill>
+                  <a:schemeClr val="tx1"/>
+                </a:solidFill>
+                <a:latin typeface="+mn-lt"/>
+                <a:ea typeface="+mn-ea"/>
+                <a:cs typeface="+mn-cs"/>
+              </a:defRPr>
+            </a:lvl6pPr>
+            <a:lvl7pPr marL="2971800" indent="-228600" algn="l" defTabSz="914400" rtl="0" eaLnBrk="1" latinLnBrk="0" hangingPunct="1">
+              <a:lnSpc>
+                <a:spcPct val="90000"/>
+              </a:lnSpc>
+              <a:spcBef>
+                <a:spcPts val="500"/>
+              </a:spcBef>
+              <a:buFont typeface="Arial" panose="020B0604020202020204" pitchFamily="34" charset="0"/>
+              <a:buChar char="•"/>
+              <a:defRPr sz="1800" kern="1200">
+                <a:solidFill>
+                  <a:schemeClr val="tx1"/>
+                </a:solidFill>
+                <a:latin typeface="+mn-lt"/>
+                <a:ea typeface="+mn-ea"/>
+                <a:cs typeface="+mn-cs"/>
+              </a:defRPr>
+            </a:lvl7pPr>
+            <a:lvl8pPr marL="3429000" indent="-228600" algn="l" defTabSz="914400" rtl="0" eaLnBrk="1" latinLnBrk="0" hangingPunct="1">
+              <a:lnSpc>
+                <a:spcPct val="90000"/>
+              </a:lnSpc>
+              <a:spcBef>
+                <a:spcPts val="500"/>
+              </a:spcBef>
+              <a:buFont typeface="Arial" panose="020B0604020202020204" pitchFamily="34" charset="0"/>
+              <a:buChar char="•"/>
+              <a:defRPr sz="1800" kern="1200">
+                <a:solidFill>
+                  <a:schemeClr val="tx1"/>
+                </a:solidFill>
+                <a:latin typeface="+mn-lt"/>
+                <a:ea typeface="+mn-ea"/>
+                <a:cs typeface="+mn-cs"/>
+              </a:defRPr>
+            </a:lvl8pPr>
+            <a:lvl9pPr marL="3886200" indent="-228600" algn="l" defTabSz="914400" rtl="0" eaLnBrk="1" latinLnBrk="0" hangingPunct="1">
+              <a:lnSpc>
+                <a:spcPct val="90000"/>
+              </a:lnSpc>
+              <a:spcBef>
+                <a:spcPts val="500"/>
+              </a:spcBef>
+              <a:buFont typeface="Arial" panose="020B0604020202020204" pitchFamily="34" charset="0"/>
+              <a:buChar char="•"/>
+              <a:defRPr sz="1800" kern="1200">
+                <a:solidFill>
+                  <a:schemeClr val="tx1"/>
+                </a:solidFill>
+                <a:latin typeface="+mn-lt"/>
+                <a:ea typeface="+mn-ea"/>
+                <a:cs typeface="+mn-cs"/>
+              </a:defRPr>
+            </a:lvl9pPr>
+          </a:lstStyle>
+          <a:p>
+            <a:pPr marL="0" indent="0">
+              <a:buNone/>
+            </a:pPr>
+            <a:r>
+              <a:rPr lang="en-US" sz="1800" b="1" dirty="0"/>
+              <a:t>Allow user to import csv with time-invariant values</a:t>
+            </a:r>
+          </a:p>
+          <a:p>
+            <a:r>
+              <a:rPr lang="en-US" sz="1800" dirty="0" err="1"/>
+              <a:t>fix_cost</a:t>
+            </a:r>
+            <a:r>
+              <a:rPr lang="en-US" sz="1800" dirty="0"/>
+              <a:t>, </a:t>
+            </a:r>
+            <a:r>
+              <a:rPr lang="en-US" sz="1800" dirty="0" err="1"/>
+              <a:t>inv_cost</a:t>
+            </a:r>
+            <a:endParaRPr lang="en-US" sz="1800" dirty="0"/>
+          </a:p>
+          <a:p>
+            <a:pPr marL="0" indent="0">
+              <a:buNone/>
+            </a:pPr>
+            <a:endParaRPr lang="en-US" sz="1800" u="sng" dirty="0"/>
+          </a:p>
+          <a:p>
+            <a:pPr marL="0" indent="0">
+              <a:buNone/>
+            </a:pPr>
+            <a:r>
+              <a:rPr lang="en-US" sz="1800" b="1" dirty="0"/>
+              <a:t>Requires regression analysis: </a:t>
+            </a:r>
+          </a:p>
+          <a:p>
+            <a:r>
+              <a:rPr lang="en-US" sz="1800" dirty="0" err="1"/>
+              <a:t>var_cost</a:t>
+            </a:r>
+            <a:endParaRPr lang="en-US" sz="1800" dirty="0"/>
+          </a:p>
+          <a:p>
+            <a:pPr marL="0" indent="0">
+              <a:buNone/>
+            </a:pPr>
+            <a:endParaRPr lang="en-US" sz="1800" u="sng" dirty="0"/>
+          </a:p>
+          <a:p>
+            <a:pPr marL="0" indent="0">
+              <a:buNone/>
+            </a:pPr>
+            <a:r>
+              <a:rPr lang="en-US" sz="1800" b="1" dirty="0"/>
+              <a:t>Not sure: </a:t>
+            </a:r>
+          </a:p>
+          <a:p>
+            <a:r>
+              <a:rPr lang="en-US" sz="1800" dirty="0" err="1"/>
+              <a:t>emission_factor</a:t>
+            </a:r>
+            <a:endParaRPr lang="en-US" sz="1800" dirty="0"/>
+          </a:p>
+          <a:p>
+            <a:r>
+              <a:rPr lang="en-US" sz="1800" dirty="0" err="1"/>
+              <a:t>historical_new_capacity</a:t>
+            </a:r>
+            <a:endParaRPr lang="en-US" sz="1800" dirty="0"/>
+          </a:p>
+          <a:p>
+            <a:r>
+              <a:rPr lang="en-US" sz="1800" dirty="0" err="1"/>
+              <a:t>ref_activity</a:t>
+            </a:r>
+            <a:endParaRPr lang="en-US" sz="1800" dirty="0"/>
+          </a:p>
+          <a:p>
+            <a:r>
+              <a:rPr lang="en-US" sz="1800" dirty="0" err="1"/>
+              <a:t>ref_new_capacity</a:t>
+            </a:r>
+            <a:endParaRPr lang="en-US" sz="1800" dirty="0"/>
+          </a:p>
+          <a:p>
+            <a:r>
+              <a:rPr lang="en-US" sz="1800" dirty="0" err="1"/>
+              <a:t>relation_activity</a:t>
+            </a:r>
+            <a:endParaRPr lang="en-US" sz="1800" dirty="0"/>
+          </a:p>
+        </p:txBody>
+      </p:sp>
+      <p:sp>
+        <p:nvSpPr>
+          <p:cNvPr id="5" name="Rectangle 4">
+            <a:extLst>
+              <a:ext uri="{FF2B5EF4-FFF2-40B4-BE49-F238E27FC236}">
+                <a16:creationId xmlns:a16="http://schemas.microsoft.com/office/drawing/2014/main" id="{CEB8195B-D760-49A2-813E-0310B0459E7A}"/>
+              </a:ext>
+            </a:extLst>
+          </p:cNvPr>
+          <p:cNvSpPr/>
+          <p:nvPr/>
+        </p:nvSpPr>
+        <p:spPr>
+          <a:xfrm>
+            <a:off x="838200" y="1825624"/>
+            <a:ext cx="5257800" cy="3392328"/>
+          </a:xfrm>
+          <a:prstGeom prst="rect">
+            <a:avLst/>
+          </a:prstGeom>
+          <a:noFill/>
+          <a:ln>
+            <a:solidFill>
+              <a:schemeClr val="tx1"/>
+            </a:solidFill>
+          </a:ln>
+        </p:spPr>
+        <p:style>
+          <a:lnRef idx="2">
+            <a:schemeClr val="accent1">
+              <a:shade val="50000"/>
+            </a:schemeClr>
+          </a:lnRef>
+          <a:fillRef idx="1">
+            <a:schemeClr val="accent1"/>
+          </a:fillRef>
+          <a:effectRef idx="0">
+            <a:schemeClr val="accent1"/>
+          </a:effectRef>
+          <a:fontRef idx="minor">
+            <a:schemeClr val="lt1"/>
+          </a:fontRef>
+        </p:style>
+        <p:txBody>
+          <a:bodyPr rtlCol="0" anchor="ctr"/>
+          <a:lstStyle/>
+          <a:p>
+            <a:pPr algn="ctr"/>
+            <a:endParaRPr lang="en-AT"/>
+          </a:p>
+        </p:txBody>
+      </p:sp>
+      <p:sp>
+        <p:nvSpPr>
+          <p:cNvPr id="6" name="Rectangle 5">
+            <a:extLst>
+              <a:ext uri="{FF2B5EF4-FFF2-40B4-BE49-F238E27FC236}">
+                <a16:creationId xmlns:a16="http://schemas.microsoft.com/office/drawing/2014/main" id="{89902F7C-E430-4667-90BA-FF859E38FCCE}"/>
+              </a:ext>
+            </a:extLst>
+          </p:cNvPr>
+          <p:cNvSpPr/>
+          <p:nvPr/>
+        </p:nvSpPr>
+        <p:spPr>
+          <a:xfrm>
+            <a:off x="838200" y="5217952"/>
+            <a:ext cx="5257800" cy="1325563"/>
+          </a:xfrm>
+          <a:prstGeom prst="rect">
+            <a:avLst/>
+          </a:prstGeom>
+          <a:noFill/>
+          <a:ln>
+            <a:solidFill>
+              <a:schemeClr val="tx1"/>
+            </a:solidFill>
+          </a:ln>
+        </p:spPr>
+        <p:style>
+          <a:lnRef idx="2">
+            <a:schemeClr val="accent1">
+              <a:shade val="50000"/>
+            </a:schemeClr>
+          </a:lnRef>
+          <a:fillRef idx="1">
+            <a:schemeClr val="accent1"/>
+          </a:fillRef>
+          <a:effectRef idx="0">
+            <a:schemeClr val="accent1"/>
+          </a:effectRef>
+          <a:fontRef idx="minor">
+            <a:schemeClr val="lt1"/>
+          </a:fontRef>
+        </p:style>
+        <p:txBody>
+          <a:bodyPr rtlCol="0" anchor="ctr"/>
+          <a:lstStyle/>
+          <a:p>
+            <a:pPr algn="ctr"/>
+            <a:endParaRPr lang="en-AT"/>
+          </a:p>
+        </p:txBody>
+      </p:sp>
+      <p:sp>
+        <p:nvSpPr>
+          <p:cNvPr id="7" name="Rectangle 6">
+            <a:extLst>
+              <a:ext uri="{FF2B5EF4-FFF2-40B4-BE49-F238E27FC236}">
+                <a16:creationId xmlns:a16="http://schemas.microsoft.com/office/drawing/2014/main" id="{9F235C25-66C2-44C8-80B4-3EE91CEFE33E}"/>
+              </a:ext>
+            </a:extLst>
+          </p:cNvPr>
+          <p:cNvSpPr/>
+          <p:nvPr/>
+        </p:nvSpPr>
+        <p:spPr>
+          <a:xfrm>
+            <a:off x="6449736" y="1825624"/>
+            <a:ext cx="5257800" cy="825297"/>
+          </a:xfrm>
+          <a:prstGeom prst="rect">
+            <a:avLst/>
+          </a:prstGeom>
+          <a:noFill/>
+          <a:ln>
+            <a:solidFill>
+              <a:schemeClr val="tx1"/>
+            </a:solidFill>
+          </a:ln>
+        </p:spPr>
+        <p:style>
+          <a:lnRef idx="2">
+            <a:schemeClr val="accent1">
+              <a:shade val="50000"/>
+            </a:schemeClr>
+          </a:lnRef>
+          <a:fillRef idx="1">
+            <a:schemeClr val="accent1"/>
+          </a:fillRef>
+          <a:effectRef idx="0">
+            <a:schemeClr val="accent1"/>
+          </a:effectRef>
+          <a:fontRef idx="minor">
+            <a:schemeClr val="lt1"/>
+          </a:fontRef>
+        </p:style>
+        <p:txBody>
+          <a:bodyPr rtlCol="0" anchor="ctr"/>
+          <a:lstStyle/>
+          <a:p>
+            <a:pPr algn="ctr"/>
+            <a:endParaRPr lang="en-AT"/>
+          </a:p>
+        </p:txBody>
+      </p:sp>
+      <p:sp>
+        <p:nvSpPr>
+          <p:cNvPr id="8" name="Rectangle 7">
+            <a:extLst>
+              <a:ext uri="{FF2B5EF4-FFF2-40B4-BE49-F238E27FC236}">
+                <a16:creationId xmlns:a16="http://schemas.microsoft.com/office/drawing/2014/main" id="{81C443B7-3B5A-4A15-A493-B952AD220DBE}"/>
+              </a:ext>
+            </a:extLst>
+          </p:cNvPr>
+          <p:cNvSpPr/>
+          <p:nvPr/>
+        </p:nvSpPr>
+        <p:spPr>
+          <a:xfrm>
+            <a:off x="6449736" y="2652319"/>
+            <a:ext cx="5257800" cy="1156283"/>
+          </a:xfrm>
+          <a:prstGeom prst="rect">
+            <a:avLst/>
+          </a:prstGeom>
+          <a:noFill/>
+          <a:ln>
+            <a:solidFill>
+              <a:schemeClr val="tx1"/>
+            </a:solidFill>
+          </a:ln>
+        </p:spPr>
+        <p:style>
+          <a:lnRef idx="2">
+            <a:schemeClr val="accent1">
+              <a:shade val="50000"/>
+            </a:schemeClr>
+          </a:lnRef>
+          <a:fillRef idx="1">
+            <a:schemeClr val="accent1"/>
+          </a:fillRef>
+          <a:effectRef idx="0">
+            <a:schemeClr val="accent1"/>
+          </a:effectRef>
+          <a:fontRef idx="minor">
+            <a:schemeClr val="lt1"/>
+          </a:fontRef>
+        </p:style>
+        <p:txBody>
+          <a:bodyPr rtlCol="0" anchor="ctr"/>
+          <a:lstStyle/>
+          <a:p>
+            <a:pPr algn="ctr"/>
+            <a:endParaRPr lang="en-AT"/>
+          </a:p>
+        </p:txBody>
+      </p:sp>
+      <p:sp>
+        <p:nvSpPr>
+          <p:cNvPr id="9" name="Rectangle 8">
+            <a:extLst>
+              <a:ext uri="{FF2B5EF4-FFF2-40B4-BE49-F238E27FC236}">
+                <a16:creationId xmlns:a16="http://schemas.microsoft.com/office/drawing/2014/main" id="{73661B69-2E49-4EF4-AEAE-4956B8BDB514}"/>
+              </a:ext>
+            </a:extLst>
+          </p:cNvPr>
+          <p:cNvSpPr/>
+          <p:nvPr/>
+        </p:nvSpPr>
+        <p:spPr>
+          <a:xfrm>
+            <a:off x="6449736" y="3808602"/>
+            <a:ext cx="5257800" cy="2684273"/>
+          </a:xfrm>
+          <a:prstGeom prst="rect">
+            <a:avLst/>
+          </a:prstGeom>
+          <a:noFill/>
+          <a:ln>
+            <a:solidFill>
+              <a:schemeClr val="tx1"/>
+            </a:solidFill>
+          </a:ln>
+        </p:spPr>
+        <p:style>
+          <a:lnRef idx="2">
+            <a:schemeClr val="accent1">
+              <a:shade val="50000"/>
+            </a:schemeClr>
+          </a:lnRef>
+          <a:fillRef idx="1">
+            <a:schemeClr val="accent1"/>
+          </a:fillRef>
+          <a:effectRef idx="0">
+            <a:schemeClr val="accent1"/>
+          </a:effectRef>
+          <a:fontRef idx="minor">
+            <a:schemeClr val="lt1"/>
+          </a:fontRef>
+        </p:style>
+        <p:txBody>
+          <a:bodyPr rtlCol="0" anchor="ctr"/>
+          <a:lstStyle/>
+          <a:p>
+            <a:pPr algn="ctr"/>
+            <a:endParaRPr lang="en-AT"/>
           </a:p>
         </p:txBody>
       </p:sp>
     </p:spTree>
     <p:extLst>
       <p:ext uri="{BB962C8B-B14F-4D97-AF65-F5344CB8AC3E}">
-        <p14:creationId xmlns:p14="http://schemas.microsoft.com/office/powerpoint/2010/main" val="812817185"/>
+        <p14:creationId xmlns:p14="http://schemas.microsoft.com/office/powerpoint/2010/main" val="2501698232"/>
       </p:ext>
     </p:extLst>
   </p:cSld>
@@ -14491,14 +15661,14 @@
           <a:p>
             <a:r>
               <a:rPr lang="en-US" sz="3600" b="1" dirty="0"/>
-              <a:t>Energy costs in database</a:t>
+              <a:t>Regression analysis</a:t>
             </a:r>
             <a:br>
               <a:rPr lang="en-US" sz="3600" b="1" dirty="0"/>
             </a:br>
             <a:r>
               <a:rPr lang="en-US" sz="3600" dirty="0"/>
-              <a:t>Distribution of costs</a:t>
+              <a:t>Setup: A simple gravity model</a:t>
             </a:r>
             <a:endParaRPr lang="en-AT" sz="3600" b="1" dirty="0"/>
           </a:p>
@@ -14520,190 +15690,950 @@
             <p:ph idx="1"/>
           </p:nvPr>
         </p:nvSpPr>
-        <p:spPr>
-          <a:xfrm>
-            <a:off x="1676400" y="6585358"/>
-            <a:ext cx="10515600" cy="264049"/>
-          </a:xfrm>
-        </p:spPr>
+        <p:spPr/>
         <p:txBody>
-          <a:bodyPr>
-            <a:normAutofit fontScale="92500" lnSpcReduction="20000"/>
-          </a:bodyPr>
+          <a:bodyPr/>
           <a:lstStyle/>
           <a:p>
-            <a:pPr marL="0" indent="0" algn="r">
+            <a:pPr marL="0" indent="0">
               <a:buNone/>
             </a:pPr>
-            <a:r>
-              <a:rPr lang="en-US" sz="1600" dirty="0"/>
-              <a:t>Notes: 1) commodities are not disaggregated yet, 2) data are truncated at 1000 ($/</a:t>
-            </a:r>
-            <a:r>
-              <a:rPr lang="en-US" sz="1600" dirty="0" err="1"/>
-              <a:t>GWa</a:t>
-            </a:r>
-            <a:r>
-              <a:rPr lang="en-US" sz="1600" dirty="0"/>
-              <a:t>)</a:t>
-            </a:r>
+            <a:endParaRPr lang="en-US" dirty="0"/>
+          </a:p>
+          <a:p>
+            <a:pPr lvl="1"/>
+            <a:endParaRPr lang="en-US" dirty="0"/>
+          </a:p>
+          <a:p>
+            <a:pPr lvl="1"/>
+            <a:endParaRPr lang="en-US" dirty="0"/>
+          </a:p>
+          <a:p>
+            <a:pPr lvl="1"/>
+            <a:endParaRPr lang="en-US" dirty="0"/>
+          </a:p>
+          <a:p>
+            <a:pPr lvl="1"/>
+            <a:endParaRPr lang="en-AT" dirty="0"/>
           </a:p>
         </p:txBody>
       </p:sp>
-      <p:pic>
-        <p:nvPicPr>
-          <p:cNvPr id="5" name="Picture 4">
-            <a:extLst>
-              <a:ext uri="{FF2B5EF4-FFF2-40B4-BE49-F238E27FC236}">
-                <a16:creationId xmlns:a16="http://schemas.microsoft.com/office/drawing/2014/main" id="{52F5AFEA-7D0F-4DA4-8D0C-B7400DE34D2F}"/>
-              </a:ext>
-            </a:extLst>
-          </p:cNvPr>
-          <p:cNvPicPr>
-            <a:picLocks noChangeAspect="1"/>
-          </p:cNvPicPr>
-          <p:nvPr/>
-        </p:nvPicPr>
-        <p:blipFill>
-          <a:blip r:embed="rId2"/>
-          <a:stretch>
-            <a:fillRect/>
-          </a:stretch>
-        </p:blipFill>
-        <p:spPr>
-          <a:xfrm>
-            <a:off x="668453" y="1690688"/>
-            <a:ext cx="3657600" cy="2373778"/>
-          </a:xfrm>
-          <a:prstGeom prst="rect">
-            <a:avLst/>
-          </a:prstGeom>
-        </p:spPr>
-      </p:pic>
-      <p:pic>
-        <p:nvPicPr>
-          <p:cNvPr id="6" name="Picture 5">
-            <a:extLst>
-              <a:ext uri="{FF2B5EF4-FFF2-40B4-BE49-F238E27FC236}">
-                <a16:creationId xmlns:a16="http://schemas.microsoft.com/office/drawing/2014/main" id="{74BA7BCE-86CA-425C-9BC4-91984C51CADE}"/>
-              </a:ext>
-            </a:extLst>
-          </p:cNvPr>
-          <p:cNvPicPr>
-            <a:picLocks noChangeAspect="1"/>
-          </p:cNvPicPr>
-          <p:nvPr/>
-        </p:nvPicPr>
-        <p:blipFill>
-          <a:blip r:embed="rId3"/>
-          <a:stretch>
-            <a:fillRect/>
-          </a:stretch>
-        </p:blipFill>
-        <p:spPr>
-          <a:xfrm>
-            <a:off x="838200" y="4064466"/>
-            <a:ext cx="3657600" cy="2344615"/>
-          </a:xfrm>
-          <a:prstGeom prst="rect">
-            <a:avLst/>
-          </a:prstGeom>
-        </p:spPr>
-      </p:pic>
-      <p:pic>
-        <p:nvPicPr>
-          <p:cNvPr id="7" name="Picture 6">
-            <a:extLst>
-              <a:ext uri="{FF2B5EF4-FFF2-40B4-BE49-F238E27FC236}">
-                <a16:creationId xmlns:a16="http://schemas.microsoft.com/office/drawing/2014/main" id="{B4C77247-0604-4F6C-B2F2-3A103CC62A98}"/>
-              </a:ext>
-            </a:extLst>
-          </p:cNvPr>
-          <p:cNvPicPr>
-            <a:picLocks noChangeAspect="1"/>
-          </p:cNvPicPr>
-          <p:nvPr/>
-        </p:nvPicPr>
-        <p:blipFill>
-          <a:blip r:embed="rId4"/>
-          <a:stretch>
-            <a:fillRect/>
-          </a:stretch>
-        </p:blipFill>
-        <p:spPr>
-          <a:xfrm>
-            <a:off x="4665547" y="1709806"/>
-            <a:ext cx="3657600" cy="2354660"/>
-          </a:xfrm>
-          <a:prstGeom prst="rect">
-            <a:avLst/>
-          </a:prstGeom>
-        </p:spPr>
-      </p:pic>
-      <p:pic>
-        <p:nvPicPr>
-          <p:cNvPr id="8" name="Picture 7">
-            <a:extLst>
-              <a:ext uri="{FF2B5EF4-FFF2-40B4-BE49-F238E27FC236}">
-                <a16:creationId xmlns:a16="http://schemas.microsoft.com/office/drawing/2014/main" id="{CEC7B54C-3FB3-4E83-9F9C-EDF1DD6707F6}"/>
-              </a:ext>
-            </a:extLst>
-          </p:cNvPr>
-          <p:cNvPicPr>
-            <a:picLocks noChangeAspect="1"/>
-          </p:cNvPicPr>
-          <p:nvPr/>
-        </p:nvPicPr>
-        <p:blipFill>
-          <a:blip r:embed="rId5"/>
-          <a:stretch>
-            <a:fillRect/>
-          </a:stretch>
-        </p:blipFill>
-        <p:spPr>
-          <a:xfrm>
-            <a:off x="4665547" y="4064466"/>
-            <a:ext cx="3657600" cy="2367185"/>
-          </a:xfrm>
-          <a:prstGeom prst="rect">
-            <a:avLst/>
-          </a:prstGeom>
-        </p:spPr>
-      </p:pic>
-      <p:pic>
-        <p:nvPicPr>
-          <p:cNvPr id="9" name="Picture 8">
-            <a:extLst>
-              <a:ext uri="{FF2B5EF4-FFF2-40B4-BE49-F238E27FC236}">
-                <a16:creationId xmlns:a16="http://schemas.microsoft.com/office/drawing/2014/main" id="{5F7F5985-8D74-47E7-8995-F8752E840BF4}"/>
-              </a:ext>
-            </a:extLst>
-          </p:cNvPr>
-          <p:cNvPicPr>
-            <a:picLocks noChangeAspect="1"/>
-          </p:cNvPicPr>
-          <p:nvPr/>
-        </p:nvPicPr>
-        <p:blipFill>
-          <a:blip r:embed="rId6"/>
-          <a:stretch>
-            <a:fillRect/>
-          </a:stretch>
-        </p:blipFill>
-        <p:spPr>
-          <a:xfrm>
-            <a:off x="8492894" y="1712688"/>
-            <a:ext cx="3657600" cy="2375510"/>
-          </a:xfrm>
-          <a:prstGeom prst="rect">
-            <a:avLst/>
-          </a:prstGeom>
-        </p:spPr>
-      </p:pic>
+      <mc:AlternateContent xmlns:mc="http://schemas.openxmlformats.org/markup-compatibility/2006">
+        <mc:Choice xmlns:a14="http://schemas.microsoft.com/office/drawing/2010/main" Requires="a14">
+          <p:sp>
+            <p:nvSpPr>
+              <p:cNvPr id="6" name="TextBox 5">
+                <a:extLst>
+                  <a:ext uri="{FF2B5EF4-FFF2-40B4-BE49-F238E27FC236}">
+                    <a16:creationId xmlns:a16="http://schemas.microsoft.com/office/drawing/2014/main" id="{0D6A4C1D-0CE8-4D41-9DAE-6DBD1E769A3C}"/>
+                  </a:ext>
+                </a:extLst>
+              </p:cNvPr>
+              <p:cNvSpPr txBox="1"/>
+              <p:nvPr/>
+            </p:nvSpPr>
+            <p:spPr>
+              <a:xfrm>
+                <a:off x="1923654" y="2980031"/>
+                <a:ext cx="8344691" cy="1346907"/>
+              </a:xfrm>
+              <a:prstGeom prst="rect">
+                <a:avLst/>
+              </a:prstGeom>
+              <a:noFill/>
+            </p:spPr>
+            <p:txBody>
+              <a:bodyPr wrap="square" lIns="0" tIns="0" rIns="0" bIns="0" rtlCol="0">
+                <a:spAutoFit/>
+              </a:bodyPr>
+              <a:lstStyle/>
+              <a:p>
+                <a:pPr>
+                  <a:lnSpc>
+                    <a:spcPct val="150000"/>
+                  </a:lnSpc>
+                </a:pPr>
+                <a14:m>
+                  <m:oMathPara xmlns:m="http://schemas.openxmlformats.org/officeDocument/2006/math">
+                    <m:oMathParaPr>
+                      <m:jc m:val="centerGroup"/>
+                    </m:oMathParaPr>
+                    <m:oMath xmlns:m="http://schemas.openxmlformats.org/officeDocument/2006/math">
+                      <m:r>
+                        <a:rPr lang="en-US" b="0" i="1" smtClean="0">
+                          <a:latin typeface="Cambria Math" panose="02040503050406030204" pitchFamily="18" charset="0"/>
+                        </a:rPr>
+                        <m:t>𝑣𝑎𝑟𝑐𝑜𝑠</m:t>
+                      </m:r>
+                      <m:sSub>
+                        <m:sSubPr>
+                          <m:ctrlPr>
+                            <a:rPr lang="en-US" b="0" i="1" smtClean="0">
+                              <a:latin typeface="Cambria Math" panose="02040503050406030204" pitchFamily="18" charset="0"/>
+                            </a:rPr>
+                          </m:ctrlPr>
+                        </m:sSubPr>
+                        <m:e>
+                          <m:r>
+                            <a:rPr lang="en-US" b="0" i="1" smtClean="0">
+                              <a:latin typeface="Cambria Math" panose="02040503050406030204" pitchFamily="18" charset="0"/>
+                            </a:rPr>
+                            <m:t>𝑡</m:t>
+                          </m:r>
+                        </m:e>
+                        <m:sub>
+                          <m:r>
+                            <a:rPr lang="en-US" b="0" i="1" smtClean="0">
+                              <a:latin typeface="Cambria Math" panose="02040503050406030204" pitchFamily="18" charset="0"/>
+                            </a:rPr>
+                            <m:t>𝑒𝑖𝑗𝑡</m:t>
+                          </m:r>
+                        </m:sub>
+                      </m:sSub>
+                      <m:r>
+                        <a:rPr lang="en-US" b="0" i="1" smtClean="0">
+                          <a:latin typeface="Cambria Math" panose="02040503050406030204" pitchFamily="18" charset="0"/>
+                        </a:rPr>
+                        <m:t>=</m:t>
+                      </m:r>
+                      <m:sSub>
+                        <m:sSubPr>
+                          <m:ctrlPr>
+                            <a:rPr lang="en-US" b="0" i="1" smtClean="0">
+                              <a:latin typeface="Cambria Math" panose="02040503050406030204" pitchFamily="18" charset="0"/>
+                            </a:rPr>
+                          </m:ctrlPr>
+                        </m:sSubPr>
+                        <m:e>
+                          <m:r>
+                            <a:rPr lang="en-US" b="0" i="1" smtClean="0">
+                              <a:latin typeface="Cambria Math" panose="02040503050406030204" pitchFamily="18" charset="0"/>
+                            </a:rPr>
+                            <m:t>𝛽</m:t>
+                          </m:r>
+                        </m:e>
+                        <m:sub>
+                          <m:r>
+                            <a:rPr lang="en-US" b="0" i="1" smtClean="0">
+                              <a:latin typeface="Cambria Math" panose="02040503050406030204" pitchFamily="18" charset="0"/>
+                            </a:rPr>
+                            <m:t>0</m:t>
+                          </m:r>
+                        </m:sub>
+                      </m:sSub>
+                      <m:r>
+                        <a:rPr lang="en-US" b="0" i="1" smtClean="0">
+                          <a:latin typeface="Cambria Math" panose="02040503050406030204" pitchFamily="18" charset="0"/>
+                        </a:rPr>
+                        <m:t>+</m:t>
+                      </m:r>
+                      <m:sSub>
+                        <m:sSubPr>
+                          <m:ctrlPr>
+                            <a:rPr lang="en-US" b="0" i="1" smtClean="0">
+                              <a:latin typeface="Cambria Math" panose="02040503050406030204" pitchFamily="18" charset="0"/>
+                            </a:rPr>
+                          </m:ctrlPr>
+                        </m:sSubPr>
+                        <m:e>
+                          <m:r>
+                            <a:rPr lang="en-US" b="0" i="1" smtClean="0">
+                              <a:latin typeface="Cambria Math" panose="02040503050406030204" pitchFamily="18" charset="0"/>
+                            </a:rPr>
+                            <m:t>𝛽</m:t>
+                          </m:r>
+                        </m:e>
+                        <m:sub>
+                          <m:r>
+                            <a:rPr lang="en-US" b="0" i="1" smtClean="0">
+                              <a:latin typeface="Cambria Math" panose="02040503050406030204" pitchFamily="18" charset="0"/>
+                            </a:rPr>
+                            <m:t>1</m:t>
+                          </m:r>
+                        </m:sub>
+                      </m:sSub>
+                      <m:r>
+                        <a:rPr lang="en-US" b="0" i="1" smtClean="0">
+                          <a:latin typeface="Cambria Math" panose="02040503050406030204" pitchFamily="18" charset="0"/>
+                        </a:rPr>
+                        <m:t>𝑑𝑖𝑠𝑡𝑎𝑛𝑐</m:t>
+                      </m:r>
+                      <m:sSub>
+                        <m:sSubPr>
+                          <m:ctrlPr>
+                            <a:rPr lang="en-US" b="0" i="1" smtClean="0">
+                              <a:latin typeface="Cambria Math" panose="02040503050406030204" pitchFamily="18" charset="0"/>
+                            </a:rPr>
+                          </m:ctrlPr>
+                        </m:sSubPr>
+                        <m:e>
+                          <m:r>
+                            <a:rPr lang="en-US" b="0" i="1" smtClean="0">
+                              <a:latin typeface="Cambria Math" panose="02040503050406030204" pitchFamily="18" charset="0"/>
+                            </a:rPr>
+                            <m:t>𝑒</m:t>
+                          </m:r>
+                        </m:e>
+                        <m:sub>
+                          <m:r>
+                            <a:rPr lang="en-US" b="0" i="1" smtClean="0">
+                              <a:latin typeface="Cambria Math" panose="02040503050406030204" pitchFamily="18" charset="0"/>
+                            </a:rPr>
+                            <m:t>𝑖𝑗</m:t>
+                          </m:r>
+                        </m:sub>
+                      </m:sSub>
+                      <m:r>
+                        <a:rPr lang="en-US" b="0" i="1" smtClean="0">
+                          <a:latin typeface="Cambria Math" panose="02040503050406030204" pitchFamily="18" charset="0"/>
+                        </a:rPr>
+                        <m:t>+</m:t>
+                      </m:r>
+                      <m:sSub>
+                        <m:sSubPr>
+                          <m:ctrlPr>
+                            <a:rPr lang="en-US" b="0" i="1" smtClean="0">
+                              <a:latin typeface="Cambria Math" panose="02040503050406030204" pitchFamily="18" charset="0"/>
+                            </a:rPr>
+                          </m:ctrlPr>
+                        </m:sSubPr>
+                        <m:e>
+                          <m:r>
+                            <a:rPr lang="en-US" b="0" i="1" smtClean="0">
+                              <a:latin typeface="Cambria Math" panose="02040503050406030204" pitchFamily="18" charset="0"/>
+                            </a:rPr>
+                            <m:t>𝛽</m:t>
+                          </m:r>
+                        </m:e>
+                        <m:sub>
+                          <m:r>
+                            <a:rPr lang="en-US" b="0" i="1" smtClean="0">
+                              <a:latin typeface="Cambria Math" panose="02040503050406030204" pitchFamily="18" charset="0"/>
+                            </a:rPr>
+                            <m:t>2</m:t>
+                          </m:r>
+                        </m:sub>
+                      </m:sSub>
+                      <m:r>
+                        <a:rPr lang="en-US" b="0" i="1" smtClean="0">
+                          <a:latin typeface="Cambria Math" panose="02040503050406030204" pitchFamily="18" charset="0"/>
+                        </a:rPr>
+                        <m:t>𝐺𝐷</m:t>
+                      </m:r>
+                      <m:sSub>
+                        <m:sSubPr>
+                          <m:ctrlPr>
+                            <a:rPr lang="en-US" b="0" i="1" smtClean="0">
+                              <a:latin typeface="Cambria Math" panose="02040503050406030204" pitchFamily="18" charset="0"/>
+                            </a:rPr>
+                          </m:ctrlPr>
+                        </m:sSubPr>
+                        <m:e>
+                          <m:r>
+                            <a:rPr lang="en-US" b="0" i="1" smtClean="0">
+                              <a:latin typeface="Cambria Math" panose="02040503050406030204" pitchFamily="18" charset="0"/>
+                            </a:rPr>
+                            <m:t>𝑃</m:t>
+                          </m:r>
+                        </m:e>
+                        <m:sub>
+                          <m:r>
+                            <a:rPr lang="en-US" b="0" i="1" smtClean="0">
+                              <a:latin typeface="Cambria Math" panose="02040503050406030204" pitchFamily="18" charset="0"/>
+                            </a:rPr>
+                            <m:t>𝑖𝑡</m:t>
+                          </m:r>
+                        </m:sub>
+                      </m:sSub>
+                      <m:r>
+                        <a:rPr lang="en-US" b="0" i="1" smtClean="0">
+                          <a:latin typeface="Cambria Math" panose="02040503050406030204" pitchFamily="18" charset="0"/>
+                        </a:rPr>
+                        <m:t>+</m:t>
+                      </m:r>
+                      <m:sSub>
+                        <m:sSubPr>
+                          <m:ctrlPr>
+                            <a:rPr lang="en-US" b="0" i="1" smtClean="0">
+                              <a:latin typeface="Cambria Math" panose="02040503050406030204" pitchFamily="18" charset="0"/>
+                            </a:rPr>
+                          </m:ctrlPr>
+                        </m:sSubPr>
+                        <m:e>
+                          <m:r>
+                            <a:rPr lang="en-US" b="0" i="1" smtClean="0">
+                              <a:latin typeface="Cambria Math" panose="02040503050406030204" pitchFamily="18" charset="0"/>
+                            </a:rPr>
+                            <m:t>𝛽</m:t>
+                          </m:r>
+                        </m:e>
+                        <m:sub>
+                          <m:r>
+                            <a:rPr lang="en-US" b="0" i="1" smtClean="0">
+                              <a:latin typeface="Cambria Math" panose="02040503050406030204" pitchFamily="18" charset="0"/>
+                            </a:rPr>
+                            <m:t>3</m:t>
+                          </m:r>
+                        </m:sub>
+                      </m:sSub>
+                      <m:r>
+                        <a:rPr lang="en-US" b="0" i="1" smtClean="0">
+                          <a:latin typeface="Cambria Math" panose="02040503050406030204" pitchFamily="18" charset="0"/>
+                        </a:rPr>
+                        <m:t>𝐺𝐷</m:t>
+                      </m:r>
+                      <m:sSub>
+                        <m:sSubPr>
+                          <m:ctrlPr>
+                            <a:rPr lang="en-US" b="0" i="1" smtClean="0">
+                              <a:latin typeface="Cambria Math" panose="02040503050406030204" pitchFamily="18" charset="0"/>
+                            </a:rPr>
+                          </m:ctrlPr>
+                        </m:sSubPr>
+                        <m:e>
+                          <m:r>
+                            <a:rPr lang="en-US" b="0" i="1" smtClean="0">
+                              <a:latin typeface="Cambria Math" panose="02040503050406030204" pitchFamily="18" charset="0"/>
+                            </a:rPr>
+                            <m:t>𝑃</m:t>
+                          </m:r>
+                        </m:e>
+                        <m:sub>
+                          <m:r>
+                            <a:rPr lang="en-US" b="0" i="1" smtClean="0">
+                              <a:latin typeface="Cambria Math" panose="02040503050406030204" pitchFamily="18" charset="0"/>
+                            </a:rPr>
+                            <m:t>𝑗𝑡</m:t>
+                          </m:r>
+                        </m:sub>
+                      </m:sSub>
+                      <m:r>
+                        <a:rPr lang="en-US" b="0" i="1" smtClean="0">
+                          <a:latin typeface="Cambria Math" panose="02040503050406030204" pitchFamily="18" charset="0"/>
+                        </a:rPr>
+                        <m:t>+</m:t>
+                      </m:r>
+                      <m:sSub>
+                        <m:sSubPr>
+                          <m:ctrlPr>
+                            <a:rPr lang="en-US" b="0" i="1" smtClean="0">
+                              <a:latin typeface="Cambria Math" panose="02040503050406030204" pitchFamily="18" charset="0"/>
+                            </a:rPr>
+                          </m:ctrlPr>
+                        </m:sSubPr>
+                        <m:e>
+                          <m:r>
+                            <a:rPr lang="en-US" b="0" i="1" smtClean="0">
+                              <a:latin typeface="Cambria Math" panose="02040503050406030204" pitchFamily="18" charset="0"/>
+                            </a:rPr>
+                            <m:t>𝛽</m:t>
+                          </m:r>
+                        </m:e>
+                        <m:sub>
+                          <m:r>
+                            <a:rPr lang="en-US" b="0" i="1" smtClean="0">
+                              <a:latin typeface="Cambria Math" panose="02040503050406030204" pitchFamily="18" charset="0"/>
+                            </a:rPr>
+                            <m:t>4</m:t>
+                          </m:r>
+                        </m:sub>
+                      </m:sSub>
+                      <m:r>
+                        <a:rPr lang="en-US" b="0" i="1" smtClean="0">
+                          <a:latin typeface="Cambria Math" panose="02040503050406030204" pitchFamily="18" charset="0"/>
+                        </a:rPr>
+                        <m:t>𝑃𝑜</m:t>
+                      </m:r>
+                      <m:sSub>
+                        <m:sSubPr>
+                          <m:ctrlPr>
+                            <a:rPr lang="en-US" b="0" i="1" smtClean="0">
+                              <a:latin typeface="Cambria Math" panose="02040503050406030204" pitchFamily="18" charset="0"/>
+                            </a:rPr>
+                          </m:ctrlPr>
+                        </m:sSubPr>
+                        <m:e>
+                          <m:r>
+                            <a:rPr lang="en-US" b="0" i="1" smtClean="0">
+                              <a:latin typeface="Cambria Math" panose="02040503050406030204" pitchFamily="18" charset="0"/>
+                            </a:rPr>
+                            <m:t>𝑝</m:t>
+                          </m:r>
+                        </m:e>
+                        <m:sub>
+                          <m:r>
+                            <a:rPr lang="en-US" b="0" i="1" smtClean="0">
+                              <a:latin typeface="Cambria Math" panose="02040503050406030204" pitchFamily="18" charset="0"/>
+                            </a:rPr>
+                            <m:t>𝑖𝑡</m:t>
+                          </m:r>
+                        </m:sub>
+                      </m:sSub>
+                      <m:r>
+                        <a:rPr lang="en-US" b="0" i="1" smtClean="0">
+                          <a:latin typeface="Cambria Math" panose="02040503050406030204" pitchFamily="18" charset="0"/>
+                        </a:rPr>
+                        <m:t>+</m:t>
+                      </m:r>
+                      <m:sSub>
+                        <m:sSubPr>
+                          <m:ctrlPr>
+                            <a:rPr lang="en-US" b="0" i="1" smtClean="0">
+                              <a:latin typeface="Cambria Math" panose="02040503050406030204" pitchFamily="18" charset="0"/>
+                            </a:rPr>
+                          </m:ctrlPr>
+                        </m:sSubPr>
+                        <m:e>
+                          <m:r>
+                            <a:rPr lang="en-US" b="0" i="1" smtClean="0">
+                              <a:latin typeface="Cambria Math" panose="02040503050406030204" pitchFamily="18" charset="0"/>
+                            </a:rPr>
+                            <m:t>𝛽</m:t>
+                          </m:r>
+                        </m:e>
+                        <m:sub>
+                          <m:r>
+                            <a:rPr lang="en-US" b="0" i="1" smtClean="0">
+                              <a:latin typeface="Cambria Math" panose="02040503050406030204" pitchFamily="18" charset="0"/>
+                            </a:rPr>
+                            <m:t>5</m:t>
+                          </m:r>
+                        </m:sub>
+                      </m:sSub>
+                      <m:r>
+                        <a:rPr lang="en-US" b="0" i="1" smtClean="0">
+                          <a:latin typeface="Cambria Math" panose="02040503050406030204" pitchFamily="18" charset="0"/>
+                        </a:rPr>
+                        <m:t>𝑃𝑜</m:t>
+                      </m:r>
+                      <m:sSub>
+                        <m:sSubPr>
+                          <m:ctrlPr>
+                            <a:rPr lang="en-US" b="0" i="1" smtClean="0">
+                              <a:latin typeface="Cambria Math" panose="02040503050406030204" pitchFamily="18" charset="0"/>
+                            </a:rPr>
+                          </m:ctrlPr>
+                        </m:sSubPr>
+                        <m:e>
+                          <m:r>
+                            <a:rPr lang="en-US" b="0" i="1" smtClean="0">
+                              <a:latin typeface="Cambria Math" panose="02040503050406030204" pitchFamily="18" charset="0"/>
+                            </a:rPr>
+                            <m:t>𝑝</m:t>
+                          </m:r>
+                        </m:e>
+                        <m:sub>
+                          <m:r>
+                            <a:rPr lang="en-US" b="0" i="1" smtClean="0">
+                              <a:latin typeface="Cambria Math" panose="02040503050406030204" pitchFamily="18" charset="0"/>
+                            </a:rPr>
+                            <m:t>𝑗𝑡</m:t>
+                          </m:r>
+                        </m:sub>
+                      </m:sSub>
+                      <m:r>
+                        <a:rPr lang="en-US" b="0" i="1" smtClean="0">
+                          <a:latin typeface="Cambria Math" panose="02040503050406030204" pitchFamily="18" charset="0"/>
+                        </a:rPr>
+                        <m:t>+</m:t>
+                      </m:r>
+                      <m:sSub>
+                        <m:sSubPr>
+                          <m:ctrlPr>
+                            <a:rPr lang="en-US" b="0" i="1" smtClean="0">
+                              <a:latin typeface="Cambria Math" panose="02040503050406030204" pitchFamily="18" charset="0"/>
+                            </a:rPr>
+                          </m:ctrlPr>
+                        </m:sSubPr>
+                        <m:e>
+                          <m:r>
+                            <a:rPr lang="en-US" b="0" i="1" smtClean="0">
+                              <a:latin typeface="Cambria Math" panose="02040503050406030204" pitchFamily="18" charset="0"/>
+                            </a:rPr>
+                            <m:t>𝛽</m:t>
+                          </m:r>
+                        </m:e>
+                        <m:sub>
+                          <m:r>
+                            <a:rPr lang="en-US" b="0" i="1" smtClean="0">
+                              <a:latin typeface="Cambria Math" panose="02040503050406030204" pitchFamily="18" charset="0"/>
+                            </a:rPr>
+                            <m:t>6</m:t>
+                          </m:r>
+                        </m:sub>
+                      </m:sSub>
+                      <m:r>
+                        <a:rPr lang="en-US" b="0" i="1" smtClean="0">
+                          <a:latin typeface="Cambria Math" panose="02040503050406030204" pitchFamily="18" charset="0"/>
+                        </a:rPr>
+                        <m:t>𝑐𝑜𝑛𝑡𝑖</m:t>
+                      </m:r>
+                      <m:sSub>
+                        <m:sSubPr>
+                          <m:ctrlPr>
+                            <a:rPr lang="en-US" b="0" i="1" smtClean="0">
+                              <a:latin typeface="Cambria Math" panose="02040503050406030204" pitchFamily="18" charset="0"/>
+                            </a:rPr>
+                          </m:ctrlPr>
+                        </m:sSubPr>
+                        <m:e>
+                          <m:r>
+                            <a:rPr lang="en-US" b="0" i="1" smtClean="0">
+                              <a:latin typeface="Cambria Math" panose="02040503050406030204" pitchFamily="18" charset="0"/>
+                            </a:rPr>
+                            <m:t>𝑔</m:t>
+                          </m:r>
+                        </m:e>
+                        <m:sub>
+                          <m:r>
+                            <a:rPr lang="en-US" b="0" i="1" smtClean="0">
+                              <a:latin typeface="Cambria Math" panose="02040503050406030204" pitchFamily="18" charset="0"/>
+                            </a:rPr>
+                            <m:t>𝑖𝑗</m:t>
+                          </m:r>
+                        </m:sub>
+                      </m:sSub>
+                      <m:r>
+                        <a:rPr lang="en-US" b="0" i="1" smtClean="0">
+                          <a:latin typeface="Cambria Math" panose="02040503050406030204" pitchFamily="18" charset="0"/>
+                        </a:rPr>
+                        <m:t>+</m:t>
+                      </m:r>
+                      <m:sSub>
+                        <m:sSubPr>
+                          <m:ctrlPr>
+                            <a:rPr lang="en-US" b="0" i="1" smtClean="0">
+                              <a:latin typeface="Cambria Math" panose="02040503050406030204" pitchFamily="18" charset="0"/>
+                            </a:rPr>
+                          </m:ctrlPr>
+                        </m:sSubPr>
+                        <m:e>
+                          <m:r>
+                            <a:rPr lang="en-US" b="0" i="1" smtClean="0">
+                              <a:latin typeface="Cambria Math" panose="02040503050406030204" pitchFamily="18" charset="0"/>
+                            </a:rPr>
+                            <m:t>𝛽</m:t>
+                          </m:r>
+                        </m:e>
+                        <m:sub>
+                          <m:r>
+                            <a:rPr lang="en-US" b="0" i="1" smtClean="0">
+                              <a:latin typeface="Cambria Math" panose="02040503050406030204" pitchFamily="18" charset="0"/>
+                            </a:rPr>
+                            <m:t>7</m:t>
+                          </m:r>
+                        </m:sub>
+                      </m:sSub>
+                      <m:r>
+                        <a:rPr lang="en-US" b="0" i="1" smtClean="0">
+                          <a:latin typeface="Cambria Math" panose="02040503050406030204" pitchFamily="18" charset="0"/>
+                        </a:rPr>
+                        <m:t>𝑐𝑜𝑚𝑙𝑎𝑛</m:t>
+                      </m:r>
+                      <m:sSub>
+                        <m:sSubPr>
+                          <m:ctrlPr>
+                            <a:rPr lang="en-US" b="0" i="1" smtClean="0">
+                              <a:latin typeface="Cambria Math" panose="02040503050406030204" pitchFamily="18" charset="0"/>
+                            </a:rPr>
+                          </m:ctrlPr>
+                        </m:sSubPr>
+                        <m:e>
+                          <m:r>
+                            <a:rPr lang="en-US" b="0" i="1" smtClean="0">
+                              <a:latin typeface="Cambria Math" panose="02040503050406030204" pitchFamily="18" charset="0"/>
+                            </a:rPr>
+                            <m:t>𝑔</m:t>
+                          </m:r>
+                        </m:e>
+                        <m:sub>
+                          <m:r>
+                            <a:rPr lang="en-US" b="0" i="1" smtClean="0">
+                              <a:latin typeface="Cambria Math" panose="02040503050406030204" pitchFamily="18" charset="0"/>
+                            </a:rPr>
+                            <m:t>𝑖𝑗</m:t>
+                          </m:r>
+                        </m:sub>
+                      </m:sSub>
+                      <m:r>
+                        <a:rPr lang="en-US" b="0" i="1" smtClean="0">
+                          <a:latin typeface="Cambria Math" panose="02040503050406030204" pitchFamily="18" charset="0"/>
+                        </a:rPr>
+                        <m:t>+</m:t>
+                      </m:r>
+                      <m:sSub>
+                        <m:sSubPr>
+                          <m:ctrlPr>
+                            <a:rPr lang="en-US" b="0" i="1" smtClean="0">
+                              <a:latin typeface="Cambria Math" panose="02040503050406030204" pitchFamily="18" charset="0"/>
+                            </a:rPr>
+                          </m:ctrlPr>
+                        </m:sSubPr>
+                        <m:e>
+                          <m:r>
+                            <a:rPr lang="en-US" b="0" i="1" smtClean="0">
+                              <a:latin typeface="Cambria Math" panose="02040503050406030204" pitchFamily="18" charset="0"/>
+                            </a:rPr>
+                            <m:t>𝛽</m:t>
+                          </m:r>
+                        </m:e>
+                        <m:sub>
+                          <m:r>
+                            <a:rPr lang="en-US" b="0" i="1" smtClean="0">
+                              <a:latin typeface="Cambria Math" panose="02040503050406030204" pitchFamily="18" charset="0"/>
+                            </a:rPr>
+                            <m:t>8</m:t>
+                          </m:r>
+                        </m:sub>
+                      </m:sSub>
+                      <m:r>
+                        <a:rPr lang="en-US" b="0" i="1" smtClean="0">
+                          <a:latin typeface="Cambria Math" panose="02040503050406030204" pitchFamily="18" charset="0"/>
+                        </a:rPr>
+                        <m:t>𝑐𝑜𝑙𝑜𝑛</m:t>
+                      </m:r>
+                      <m:sSub>
+                        <m:sSubPr>
+                          <m:ctrlPr>
+                            <a:rPr lang="en-US" b="0" i="1" smtClean="0">
+                              <a:latin typeface="Cambria Math" panose="02040503050406030204" pitchFamily="18" charset="0"/>
+                            </a:rPr>
+                          </m:ctrlPr>
+                        </m:sSubPr>
+                        <m:e>
+                          <m:r>
+                            <a:rPr lang="en-US" b="0" i="1" smtClean="0">
+                              <a:latin typeface="Cambria Math" panose="02040503050406030204" pitchFamily="18" charset="0"/>
+                            </a:rPr>
+                            <m:t>𝑦</m:t>
+                          </m:r>
+                        </m:e>
+                        <m:sub>
+                          <m:r>
+                            <a:rPr lang="en-US" b="0" i="1" smtClean="0">
+                              <a:latin typeface="Cambria Math" panose="02040503050406030204" pitchFamily="18" charset="0"/>
+                            </a:rPr>
+                            <m:t>𝑖</m:t>
+                          </m:r>
+                        </m:sub>
+                      </m:sSub>
+                      <m:r>
+                        <a:rPr lang="en-US" b="0" i="1" smtClean="0">
+                          <a:latin typeface="Cambria Math" panose="02040503050406030204" pitchFamily="18" charset="0"/>
+                        </a:rPr>
+                        <m:t>+</m:t>
+                      </m:r>
+                      <m:sSub>
+                        <m:sSubPr>
+                          <m:ctrlPr>
+                            <a:rPr lang="en-US" b="0" i="1" smtClean="0">
+                              <a:latin typeface="Cambria Math" panose="02040503050406030204" pitchFamily="18" charset="0"/>
+                            </a:rPr>
+                          </m:ctrlPr>
+                        </m:sSubPr>
+                        <m:e>
+                          <m:r>
+                            <a:rPr lang="en-US" b="0" i="1" smtClean="0">
+                              <a:latin typeface="Cambria Math" panose="02040503050406030204" pitchFamily="18" charset="0"/>
+                            </a:rPr>
+                            <m:t>𝛽</m:t>
+                          </m:r>
+                        </m:e>
+                        <m:sub>
+                          <m:r>
+                            <a:rPr lang="en-US" b="0" i="1" smtClean="0">
+                              <a:latin typeface="Cambria Math" panose="02040503050406030204" pitchFamily="18" charset="0"/>
+                            </a:rPr>
+                            <m:t>9</m:t>
+                          </m:r>
+                        </m:sub>
+                      </m:sSub>
+                      <m:r>
+                        <a:rPr lang="en-US" b="0" i="1" smtClean="0">
+                          <a:latin typeface="Cambria Math" panose="02040503050406030204" pitchFamily="18" charset="0"/>
+                        </a:rPr>
+                        <m:t>𝑐𝑜𝑙𝑜𝑛</m:t>
+                      </m:r>
+                      <m:sSub>
+                        <m:sSubPr>
+                          <m:ctrlPr>
+                            <a:rPr lang="en-US" b="0" i="1" smtClean="0">
+                              <a:latin typeface="Cambria Math" panose="02040503050406030204" pitchFamily="18" charset="0"/>
+                            </a:rPr>
+                          </m:ctrlPr>
+                        </m:sSubPr>
+                        <m:e>
+                          <m:r>
+                            <a:rPr lang="en-US" b="0" i="1" smtClean="0">
+                              <a:latin typeface="Cambria Math" panose="02040503050406030204" pitchFamily="18" charset="0"/>
+                            </a:rPr>
+                            <m:t>𝑦</m:t>
+                          </m:r>
+                        </m:e>
+                        <m:sub>
+                          <m:r>
+                            <a:rPr lang="en-US" b="0" i="1" smtClean="0">
+                              <a:latin typeface="Cambria Math" panose="02040503050406030204" pitchFamily="18" charset="0"/>
+                            </a:rPr>
+                            <m:t>𝑗</m:t>
+                          </m:r>
+                        </m:sub>
+                      </m:sSub>
+                      <m:r>
+                        <a:rPr lang="en-US" b="0" i="1" smtClean="0">
+                          <a:latin typeface="Cambria Math" panose="02040503050406030204" pitchFamily="18" charset="0"/>
+                        </a:rPr>
+                        <m:t>+</m:t>
+                      </m:r>
+                      <m:sSub>
+                        <m:sSubPr>
+                          <m:ctrlPr>
+                            <a:rPr lang="en-US" b="0" i="1" smtClean="0">
+                              <a:latin typeface="Cambria Math" panose="02040503050406030204" pitchFamily="18" charset="0"/>
+                            </a:rPr>
+                          </m:ctrlPr>
+                        </m:sSubPr>
+                        <m:e>
+                          <m:r>
+                            <a:rPr lang="en-US" b="0" i="1" smtClean="0">
+                              <a:latin typeface="Cambria Math" panose="02040503050406030204" pitchFamily="18" charset="0"/>
+                            </a:rPr>
+                            <m:t>𝛽</m:t>
+                          </m:r>
+                        </m:e>
+                        <m:sub>
+                          <m:r>
+                            <a:rPr lang="en-US" b="0" i="1" smtClean="0">
+                              <a:latin typeface="Cambria Math" panose="02040503050406030204" pitchFamily="18" charset="0"/>
+                            </a:rPr>
+                            <m:t>10</m:t>
+                          </m:r>
+                        </m:sub>
+                      </m:sSub>
+                      <m:r>
+                        <a:rPr lang="en-US" b="0" i="1" smtClean="0">
+                          <a:latin typeface="Cambria Math" panose="02040503050406030204" pitchFamily="18" charset="0"/>
+                        </a:rPr>
+                        <m:t>𝑠𝑎𝑛𝑐𝑡𝑖𝑜</m:t>
+                      </m:r>
+                      <m:sSub>
+                        <m:sSubPr>
+                          <m:ctrlPr>
+                            <a:rPr lang="en-US" b="0" i="1" smtClean="0">
+                              <a:latin typeface="Cambria Math" panose="02040503050406030204" pitchFamily="18" charset="0"/>
+                            </a:rPr>
+                          </m:ctrlPr>
+                        </m:sSubPr>
+                        <m:e>
+                          <m:r>
+                            <a:rPr lang="en-US" b="0" i="1" smtClean="0">
+                              <a:latin typeface="Cambria Math" panose="02040503050406030204" pitchFamily="18" charset="0"/>
+                            </a:rPr>
+                            <m:t>𝑛</m:t>
+                          </m:r>
+                        </m:e>
+                        <m:sub>
+                          <m:r>
+                            <a:rPr lang="en-US" b="0" i="1" smtClean="0">
+                              <a:latin typeface="Cambria Math" panose="02040503050406030204" pitchFamily="18" charset="0"/>
+                            </a:rPr>
+                            <m:t>𝑖𝑗𝑡</m:t>
+                          </m:r>
+                        </m:sub>
+                      </m:sSub>
+                      <m:r>
+                        <a:rPr lang="en-US" b="0" i="1" smtClean="0">
+                          <a:latin typeface="Cambria Math" panose="02040503050406030204" pitchFamily="18" charset="0"/>
+                        </a:rPr>
+                        <m:t>+</m:t>
+                      </m:r>
+                      <m:sSub>
+                        <m:sSubPr>
+                          <m:ctrlPr>
+                            <a:rPr lang="en-US" b="0" i="1" smtClean="0">
+                              <a:latin typeface="Cambria Math" panose="02040503050406030204" pitchFamily="18" charset="0"/>
+                            </a:rPr>
+                          </m:ctrlPr>
+                        </m:sSubPr>
+                        <m:e>
+                          <m:r>
+                            <m:rPr>
+                              <m:sty m:val="p"/>
+                            </m:rPr>
+                            <a:rPr lang="en-US" b="0" i="0" smtClean="0">
+                              <a:latin typeface="Cambria Math" panose="02040503050406030204" pitchFamily="18" charset="0"/>
+                            </a:rPr>
+                            <m:t>Γ</m:t>
+                          </m:r>
+                        </m:e>
+                        <m:sub>
+                          <m:r>
+                            <a:rPr lang="en-US" b="0" i="1" smtClean="0">
+                              <a:latin typeface="Cambria Math" panose="02040503050406030204" pitchFamily="18" charset="0"/>
+                            </a:rPr>
+                            <m:t>𝑖</m:t>
+                          </m:r>
+                        </m:sub>
+                      </m:sSub>
+                      <m:r>
+                        <a:rPr lang="en-US" b="0" i="1" smtClean="0">
+                          <a:latin typeface="Cambria Math" panose="02040503050406030204" pitchFamily="18" charset="0"/>
+                        </a:rPr>
+                        <m:t>+</m:t>
+                      </m:r>
+                      <m:sSub>
+                        <m:sSubPr>
+                          <m:ctrlPr>
+                            <a:rPr lang="en-US" b="0" i="1" smtClean="0">
+                              <a:latin typeface="Cambria Math" panose="02040503050406030204" pitchFamily="18" charset="0"/>
+                            </a:rPr>
+                          </m:ctrlPr>
+                        </m:sSubPr>
+                        <m:e>
+                          <m:r>
+                            <m:rPr>
+                              <m:sty m:val="p"/>
+                            </m:rPr>
+                            <a:rPr lang="en-US" b="0" i="0" smtClean="0">
+                              <a:latin typeface="Cambria Math" panose="02040503050406030204" pitchFamily="18" charset="0"/>
+                            </a:rPr>
+                            <m:t>Θ</m:t>
+                          </m:r>
+                        </m:e>
+                        <m:sub>
+                          <m:r>
+                            <a:rPr lang="en-US" b="0" i="1" smtClean="0">
+                              <a:latin typeface="Cambria Math" panose="02040503050406030204" pitchFamily="18" charset="0"/>
+                            </a:rPr>
+                            <m:t>𝑗</m:t>
+                          </m:r>
+                        </m:sub>
+                      </m:sSub>
+                      <m:r>
+                        <a:rPr lang="en-US" b="0" i="1" smtClean="0">
+                          <a:latin typeface="Cambria Math" panose="02040503050406030204" pitchFamily="18" charset="0"/>
+                        </a:rPr>
+                        <m:t>+</m:t>
+                      </m:r>
+                      <m:sSub>
+                        <m:sSubPr>
+                          <m:ctrlPr>
+                            <a:rPr lang="en-US" b="0" i="1" smtClean="0">
+                              <a:latin typeface="Cambria Math" panose="02040503050406030204" pitchFamily="18" charset="0"/>
+                            </a:rPr>
+                          </m:ctrlPr>
+                        </m:sSubPr>
+                        <m:e>
+                          <m:r>
+                            <m:rPr>
+                              <m:sty m:val="p"/>
+                            </m:rPr>
+                            <a:rPr lang="en-US" b="0" i="0" smtClean="0">
+                              <a:latin typeface="Cambria Math" panose="02040503050406030204" pitchFamily="18" charset="0"/>
+                            </a:rPr>
+                            <m:t>Δ</m:t>
+                          </m:r>
+                        </m:e>
+                        <m:sub>
+                          <m:r>
+                            <a:rPr lang="en-US" b="0" i="1" smtClean="0">
+                              <a:latin typeface="Cambria Math" panose="02040503050406030204" pitchFamily="18" charset="0"/>
+                            </a:rPr>
+                            <m:t>𝑡</m:t>
+                          </m:r>
+                        </m:sub>
+                      </m:sSub>
+                      <m:r>
+                        <a:rPr lang="en-US" b="0" i="1" smtClean="0">
+                          <a:latin typeface="Cambria Math" panose="02040503050406030204" pitchFamily="18" charset="0"/>
+                        </a:rPr>
+                        <m:t>+</m:t>
+                      </m:r>
+                      <m:sSub>
+                        <m:sSubPr>
+                          <m:ctrlPr>
+                            <a:rPr lang="en-US" b="0" i="1" smtClean="0">
+                              <a:latin typeface="Cambria Math" panose="02040503050406030204" pitchFamily="18" charset="0"/>
+                            </a:rPr>
+                          </m:ctrlPr>
+                        </m:sSubPr>
+                        <m:e>
+                          <m:r>
+                            <m:rPr>
+                              <m:sty m:val="p"/>
+                            </m:rPr>
+                            <a:rPr lang="en-US" b="0" i="0" smtClean="0">
+                              <a:latin typeface="Cambria Math" panose="02040503050406030204" pitchFamily="18" charset="0"/>
+                            </a:rPr>
+                            <m:t>Ψ</m:t>
+                          </m:r>
+                        </m:e>
+                        <m:sub>
+                          <m:r>
+                            <a:rPr lang="en-US" b="0" i="1" smtClean="0">
+                              <a:latin typeface="Cambria Math" panose="02040503050406030204" pitchFamily="18" charset="0"/>
+                            </a:rPr>
+                            <m:t>𝑒</m:t>
+                          </m:r>
+                        </m:sub>
+                      </m:sSub>
+                    </m:oMath>
+                  </m:oMathPara>
+                </a14:m>
+                <a:endParaRPr lang="en-AT" dirty="0"/>
+              </a:p>
+            </p:txBody>
+          </p:sp>
+        </mc:Choice>
+        <mc:Fallback>
+          <p:sp>
+            <p:nvSpPr>
+              <p:cNvPr id="6" name="TextBox 5">
+                <a:extLst>
+                  <a:ext uri="{FF2B5EF4-FFF2-40B4-BE49-F238E27FC236}">
+                    <a16:creationId xmlns:a16="http://schemas.microsoft.com/office/drawing/2014/main" id="{0D6A4C1D-0CE8-4D41-9DAE-6DBD1E769A3C}"/>
+                  </a:ext>
+                </a:extLst>
+              </p:cNvPr>
+              <p:cNvSpPr txBox="1">
+                <a:spLocks noRot="1" noChangeAspect="1" noMove="1" noResize="1" noEditPoints="1" noAdjustHandles="1" noChangeArrowheads="1" noChangeShapeType="1" noTextEdit="1"/>
+              </p:cNvSpPr>
+              <p:nvPr/>
+            </p:nvSpPr>
+            <p:spPr>
+              <a:xfrm>
+                <a:off x="1923654" y="2980031"/>
+                <a:ext cx="8344691" cy="1346907"/>
+              </a:xfrm>
+              <a:prstGeom prst="rect">
+                <a:avLst/>
+              </a:prstGeom>
+              <a:blipFill>
+                <a:blip r:embed="rId2"/>
+                <a:stretch>
+                  <a:fillRect/>
+                </a:stretch>
+              </a:blipFill>
+            </p:spPr>
+            <p:txBody>
+              <a:bodyPr/>
+              <a:lstStyle/>
+              <a:p>
+                <a:r>
+                  <a:rPr lang="en-AT">
+                    <a:noFill/>
+                  </a:rPr>
+                  <a:t> </a:t>
+                </a:r>
+              </a:p>
+            </p:txBody>
+          </p:sp>
+        </mc:Fallback>
+      </mc:AlternateContent>
     </p:spTree>
     <p:extLst>
       <p:ext uri="{BB962C8B-B14F-4D97-AF65-F5344CB8AC3E}">
-        <p14:creationId xmlns:p14="http://schemas.microsoft.com/office/powerpoint/2010/main" val="3120535871"/>
+        <p14:creationId xmlns:p14="http://schemas.microsoft.com/office/powerpoint/2010/main" val="3628183441"/>
       </p:ext>
     </p:extLst>
   </p:cSld>

</xml_diff>